<commit_message>
[Poster] Final report paper and re-run DNN parameter search
Data and results added, Current run on 5 montsh at 4,000 tickets but no results
Completed 70/30 split tests on NB and small LNKD
Submission PDF attached
</commit_message>
<xml_diff>
--- a/report/poster.pptx
+++ b/report/poster.pptx
@@ -697,7 +697,7 @@
                 <a:spcPct val="0"/>
               </a:spcBef>
             </a:pPr>
-            <a:endParaRPr lang="en-US" altLang="en-US"/>
+            <a:endParaRPr lang="en-US" altLang="en-US" dirty="0"/>
           </a:p>
         </p:txBody>
       </p:sp>
@@ -4477,10 +4477,10 @@
       </p:grpSpPr>
       <p:pic>
         <p:nvPicPr>
-          <p:cNvPr id="45" name="Picture 44">
+          <p:cNvPr id="48" name="Picture 47">
             <a:extLst>
               <a:ext uri="{FF2B5EF4-FFF2-40B4-BE49-F238E27FC236}">
-                <a16:creationId xmlns:a16="http://schemas.microsoft.com/office/drawing/2014/main" id="{AEFB09A7-2BB9-D842-9B54-3AAF59E22093}"/>
+                <a16:creationId xmlns:a16="http://schemas.microsoft.com/office/drawing/2014/main" id="{C60FB99F-538A-0544-BD08-6496FFDECF1F}"/>
               </a:ext>
             </a:extLst>
           </p:cNvPr>
@@ -4497,12 +4497,47 @@
               </a:ext>
             </a:extLst>
           </a:blip>
+          <a:srcRect l="5964" t="4762" r="8597"/>
+          <a:stretch/>
+        </p:blipFill>
+        <p:spPr>
+          <a:xfrm>
+            <a:off x="19307773" y="5573559"/>
+            <a:ext cx="4186872" cy="3500284"/>
+          </a:xfrm>
+          <a:prstGeom prst="rect">
+            <a:avLst/>
+          </a:prstGeom>
+        </p:spPr>
+      </p:pic>
+      <p:pic>
+        <p:nvPicPr>
+          <p:cNvPr id="45" name="Picture 44">
+            <a:extLst>
+              <a:ext uri="{FF2B5EF4-FFF2-40B4-BE49-F238E27FC236}">
+                <a16:creationId xmlns:a16="http://schemas.microsoft.com/office/drawing/2014/main" id="{AEFB09A7-2BB9-D842-9B54-3AAF59E22093}"/>
+              </a:ext>
+            </a:extLst>
+          </p:cNvPr>
+          <p:cNvPicPr>
+            <a:picLocks noChangeAspect="1"/>
+          </p:cNvPicPr>
+          <p:nvPr/>
+        </p:nvPicPr>
+        <p:blipFill rotWithShape="1">
+          <a:blip r:embed="rId4">
+            <a:extLst>
+              <a:ext uri="{28A0092B-C50C-407E-A947-70E740481C1C}">
+                <a14:useLocalDpi xmlns:a14="http://schemas.microsoft.com/office/drawing/2010/main" val="0"/>
+              </a:ext>
+            </a:extLst>
+          </a:blip>
           <a:srcRect t="5418"/>
           <a:stretch/>
         </p:blipFill>
         <p:spPr>
           <a:xfrm>
-            <a:off x="23575677" y="9497972"/>
+            <a:off x="23768144" y="9003282"/>
             <a:ext cx="2415863" cy="1713721"/>
           </a:xfrm>
           <a:prstGeom prst="rect">
@@ -4525,7 +4560,7 @@
           <p:nvPr/>
         </p:nvPicPr>
         <p:blipFill rotWithShape="1">
-          <a:blip r:embed="rId4">
+          <a:blip r:embed="rId5">
             <a:extLst>
               <a:ext uri="{28A0092B-C50C-407E-A947-70E740481C1C}">
                 <a14:useLocalDpi xmlns:a14="http://schemas.microsoft.com/office/drawing/2010/main" val="0"/>
@@ -4537,7 +4572,7 @@
         </p:blipFill>
         <p:spPr>
           <a:xfrm>
-            <a:off x="19211982" y="9439351"/>
+            <a:off x="19091593" y="9042424"/>
             <a:ext cx="2429364" cy="1713722"/>
           </a:xfrm>
           <a:prstGeom prst="rect">
@@ -4560,7 +4595,7 @@
           <p:nvPr/>
         </p:nvPicPr>
         <p:blipFill rotWithShape="1">
-          <a:blip r:embed="rId5">
+          <a:blip r:embed="rId6">
             <a:extLst>
               <a:ext uri="{28A0092B-C50C-407E-A947-70E740481C1C}">
                 <a14:useLocalDpi xmlns:a14="http://schemas.microsoft.com/office/drawing/2010/main" val="0"/>
@@ -4618,7 +4653,7 @@
           <p:nvPr/>
         </p:nvPicPr>
         <p:blipFill>
-          <a:blip r:embed="rId6">
+          <a:blip r:embed="rId7">
             <a:extLst>
               <a:ext uri="{28A0092B-C50C-407E-A947-70E740481C1C}">
                 <a14:useLocalDpi xmlns:a14="http://schemas.microsoft.com/office/drawing/2010/main" val="0"/>
@@ -5174,6 +5209,25 @@
                   <a:defRPr/>
                 </a:pPr>
                 <a:r>
+                  <a:rPr lang="en-US" sz="1700" dirty="0">
+                    <a:ln w="0"/>
+                    <a:solidFill>
+                      <a:schemeClr val="bg1"/>
+                    </a:solidFill>
+                    <a:effectLst>
+                      <a:outerShdw blurRad="38100" dist="19050" dir="2700000" algn="tl" rotWithShape="0">
+                        <a:schemeClr val="dk1">
+                          <a:alpha val="40000"/>
+                        </a:schemeClr>
+                      </a:outerShdw>
+                    </a:effectLst>
+                    <a:latin typeface="Tahoma" panose="020B0604030504040204" pitchFamily="34" charset="0"/>
+                    <a:ea typeface="Tahoma" panose="020B0604030504040204" pitchFamily="34" charset="0"/>
+                    <a:cs typeface="Tahoma" panose="020B0604030504040204" pitchFamily="34" charset="0"/>
+                  </a:rPr>
+                  <a:t>PROBLEM</a:t>
+                </a:r>
+                <a:r>
                   <a:rPr lang="en-US" sz="1778" dirty="0">
                     <a:ln w="0"/>
                     <a:solidFill>
@@ -5190,7 +5244,7 @@
                     <a:ea typeface="Tahoma" panose="020B0604030504040204" pitchFamily="34" charset="0"/>
                     <a:cs typeface="Tahoma" panose="020B0604030504040204" pitchFamily="34" charset="0"/>
                   </a:rPr>
-                  <a:t>PROBLEM STATEMENT</a:t>
+                  <a:t> STATEMENT</a:t>
                 </a:r>
               </a:p>
             </p:txBody>
@@ -5415,7 +5469,7 @@
                       <a:schemeClr val="tx1"/>
                     </a:solidFill>
                   </a:rPr>
-                  <a:t>The corporate world deals with task management in a variety of ways with each having some form of triaging process to correctly assign tickets to developers. Automation of this task has proven elusive with less than 60% accuracy of latest ML solutions even for Web and SaaS companies that handle high volumes of tickets in the form of exceptions, support requests, user-reported bugs, and crash reports. Effective automation is essential to improve productivity and obviate the tedious work of manually triaging tickets. </a:t>
+                  <a:t>The corporate world deals with task management in a variety of ways all having some form of triaging process to correctly assign tickets to developers. Automation of this task has proven elusive with less than 60% accuracy of latest ML solutions even for Web and SaaS companies that handle high volumes of tickets in the form of exceptions, support requests, user-reported bugs, and crash reports. Effective automation is essential to improve productivity and obviate the tedious work of manually triaging tickets. </a:t>
                 </a:r>
               </a:p>
               <a:p>
@@ -5434,7 +5488,7 @@
                       <a:schemeClr val="tx1"/>
                     </a:solidFill>
                   </a:rPr>
-                  <a:t>	Project aims to reduce this overhead by deploying a deep neural network classifier to assign tickets to a developer. The DNN model is trained by using the final assignee listed in the JIRA ticket as the label and predicts a previously seen developer. .</a:t>
+                  <a:t>	Project aims to reduce this overhead by deploying a deep neural network classifier to assign tickets to a developer. The DNN model is trained by using the final assignee listed in the JIRA ticket as the label and predicts a previously seen developer on new tickets. </a:t>
                 </a:r>
               </a:p>
             </p:txBody>
@@ -5744,6 +5798,25 @@
                 <a:defRPr/>
               </a:pPr>
               <a:r>
+                <a:rPr lang="en-US" sz="1700" dirty="0">
+                  <a:ln w="0"/>
+                  <a:solidFill>
+                    <a:schemeClr val="bg1"/>
+                  </a:solidFill>
+                  <a:effectLst>
+                    <a:outerShdw blurRad="38100" dist="19050" dir="2700000" algn="tl" rotWithShape="0">
+                      <a:schemeClr val="dk1">
+                        <a:alpha val="40000"/>
+                      </a:schemeClr>
+                    </a:outerShdw>
+                  </a:effectLst>
+                  <a:latin typeface="Tahoma" panose="020B0604030504040204" pitchFamily="34" charset="0"/>
+                  <a:ea typeface="Tahoma" panose="020B0604030504040204" pitchFamily="34" charset="0"/>
+                  <a:cs typeface="Tahoma" panose="020B0604030504040204" pitchFamily="34" charset="0"/>
+                </a:rPr>
+                <a:t>DATASET</a:t>
+              </a:r>
+              <a:r>
                 <a:rPr lang="en-US" sz="1778" dirty="0">
                   <a:ln w="0"/>
                   <a:solidFill>
@@ -5760,7 +5833,7 @@
                   <a:ea typeface="Tahoma" panose="020B0604030504040204" pitchFamily="34" charset="0"/>
                   <a:cs typeface="Tahoma" panose="020B0604030504040204" pitchFamily="34" charset="0"/>
                 </a:rPr>
-                <a:t>DATASET &amp; FEATURES</a:t>
+                <a:t> &amp; FEATURES</a:t>
               </a:r>
             </a:p>
           </p:txBody>
@@ -5984,14 +6057,14 @@
                     <a:schemeClr val="tx1"/>
                   </a:solidFill>
                 </a:rPr>
-                <a:t>The project utilizes the generated </a:t>
+                <a:t>The project utilized the generated </a:t>
               </a:r>
               <a:r>
                 <a:rPr lang="en-US" sz="1600" dirty="0">
                   <a:solidFill>
                     <a:schemeClr val="tx1"/>
                   </a:solidFill>
-                  <a:hlinkClick r:id="rId7"/>
+                  <a:hlinkClick r:id="rId8"/>
                 </a:rPr>
                 <a:t>jumble.expium.com</a:t>
               </a:r>
@@ -6001,18 +6074,8 @@
                     <a:schemeClr val="tx1"/>
                   </a:solidFill>
                 </a:rPr>
-                <a:t> dataset for developing the algorithm and then applies the architecture to train and test on the LinkedIn Foundation team support ticket dataset.  The implementation uses a bag of words multinomial event model to vectorize a JIRA ticket. The text components of JIRA ticket namely: subject, body and comments, are concatenated and featurized with a frequency threshold of &gt;= 5.</a:t>
+                <a:t> dataset for developing the algorithm and then applies the architecture to train and test on the private LinkedIn Foundation team support dataset.  The implementation uses a bag of words multinomial event model to vectorize the  JIRA ticket. The text components of JIRA ticket namely: subject, body and comments, are concatenated and featurized with a frequency threshold of &gt;= 5.</a:t>
               </a:r>
-            </a:p>
-            <a:p>
-              <a:pPr>
-                <a:lnSpc>
-                  <a:spcPct val="100000"/>
-                </a:lnSpc>
-                <a:spcBef>
-                  <a:spcPts val="0"/>
-                </a:spcBef>
-              </a:pPr>
               <a:endParaRPr lang="en-US" dirty="0">
                 <a:solidFill>
                   <a:schemeClr val="tx1"/>
@@ -7187,10 +7250,10 @@
         </p:nvGrpSpPr>
         <p:grpSpPr bwMode="auto">
           <a:xfrm>
-            <a:off x="19262496" y="15515303"/>
-            <a:ext cx="7364836" cy="2443650"/>
-            <a:chOff x="2362200" y="7584255"/>
-            <a:chExt cx="3305829" cy="2625771"/>
+            <a:off x="19137142" y="15262252"/>
+            <a:ext cx="7364836" cy="2801179"/>
+            <a:chOff x="2362199" y="7584254"/>
+            <a:chExt cx="3305829" cy="2653715"/>
           </a:xfrm>
         </p:grpSpPr>
         <p:sp>
@@ -7207,7 +7270,7 @@
           </p:nvSpPr>
           <p:spPr>
             <a:xfrm>
-              <a:off x="2362200" y="7584255"/>
+              <a:off x="2362199" y="7612198"/>
               <a:ext cx="3305829" cy="2625771"/>
             </a:xfrm>
             <a:prstGeom prst="round2DiagRect">
@@ -7261,10 +7324,10 @@
           </p:nvGrpSpPr>
           <p:grpSpPr>
             <a:xfrm>
-              <a:off x="2368296" y="7584255"/>
-              <a:ext cx="3299732" cy="2538709"/>
-              <a:chOff x="1963928" y="7584255"/>
-              <a:chExt cx="3299732" cy="2538709"/>
+              <a:off x="2368296" y="7584254"/>
+              <a:ext cx="3299732" cy="2538710"/>
+              <a:chOff x="1963928" y="7584254"/>
+              <a:chExt cx="3299732" cy="2538710"/>
             </a:xfrm>
             <a:solidFill>
               <a:schemeClr val="bg1"/>
@@ -7286,15 +7349,26 @@
             </p:nvSpPr>
             <p:spPr>
               <a:xfrm>
-                <a:off x="3567653" y="7584255"/>
-                <a:ext cx="1696007" cy="446340"/>
+                <a:off x="3567653" y="7584254"/>
+                <a:ext cx="1696007" cy="519758"/>
               </a:xfrm>
               <a:prstGeom prst="rect">
                 <a:avLst/>
               </a:prstGeom>
-              <a:solidFill>
-                <a:srgbClr val="558BD2"/>
-              </a:solidFill>
+              <a:gradFill>
+                <a:gsLst>
+                  <a:gs pos="6000">
+                    <a:srgbClr val="394987"/>
+                  </a:gs>
+                  <a:gs pos="0">
+                    <a:srgbClr val="3B4785"/>
+                  </a:gs>
+                  <a:gs pos="62000">
+                    <a:srgbClr val="558BD2"/>
+                  </a:gs>
+                </a:gsLst>
+                <a:lin ang="0" scaled="0"/>
+              </a:gradFill>
               <a:ln>
                 <a:noFill/>
               </a:ln>
@@ -7710,7 +7784,7 @@
                   <a:defRPr/>
                 </a:pPr>
                 <a:r>
-                  <a:rPr lang="en-US" sz="1000" i="1" dirty="0">
+                  <a:rPr lang="en-US" sz="1200" i="1" dirty="0">
                     <a:solidFill>
                       <a:schemeClr val="tx1"/>
                     </a:solidFill>
@@ -7768,12 +7842,12 @@
                   <a:defRPr/>
                 </a:pPr>
                 <a:r>
-                  <a:rPr lang="en-US" sz="1000" i="1" dirty="0">
+                  <a:rPr lang="en-US" sz="1200" i="1" dirty="0">
                     <a:solidFill>
                       <a:schemeClr val="tx1"/>
                     </a:solidFill>
                   </a:rPr>
-                  <a:t>[] –</a:t>
+                  <a:t>[2] – Srivastava, Nitish, et al. "Dropout: a simple way to prevent neural networks from overfitting." The Journal of Machine Learning Research 15.1 (2014): 1929-1958. APA</a:t>
                 </a:r>
               </a:p>
               <a:p>
@@ -7781,12 +7855,44 @@
                   <a:defRPr/>
                 </a:pPr>
                 <a:r>
-                  <a:rPr lang="en-US" sz="1000" i="1" dirty="0">
+                  <a:rPr lang="en-US" sz="1200" i="1" dirty="0">
                     <a:solidFill>
                       <a:schemeClr val="tx1"/>
                     </a:solidFill>
                   </a:rPr>
-                  <a:t>[] –</a:t>
+                  <a:t>[3] – </a:t>
+                </a:r>
+                <a:r>
+                  <a:rPr lang="en-US" sz="1200" i="1" dirty="0" err="1">
+                    <a:solidFill>
+                      <a:schemeClr val="tx1"/>
+                    </a:solidFill>
+                  </a:rPr>
+                  <a:t>Domingos</a:t>
+                </a:r>
+                <a:r>
+                  <a:rPr lang="en-US" sz="1200" i="1" dirty="0">
+                    <a:solidFill>
+                      <a:schemeClr val="tx1"/>
+                    </a:solidFill>
+                  </a:rPr>
+                  <a:t>, P., </a:t>
+                </a:r>
+                <a:r>
+                  <a:rPr lang="en-US" sz="1200" i="1" dirty="0" err="1">
+                    <a:solidFill>
+                      <a:schemeClr val="tx1"/>
+                    </a:solidFill>
+                  </a:rPr>
+                  <a:t>Pazzani</a:t>
+                </a:r>
+                <a:r>
+                  <a:rPr lang="en-US" sz="1200" i="1" dirty="0">
+                    <a:solidFill>
+                      <a:schemeClr val="tx1"/>
+                    </a:solidFill>
+                  </a:rPr>
+                  <a:t>, M., 1996. Beyond Independence: Conditions for the Optimality of the Simple Bayesian Classifier. In: Machine Learning, Morgan Kaufmann, pp. 105–112.</a:t>
                 </a:r>
               </a:p>
               <a:p>
@@ -7794,12 +7900,44 @@
                   <a:defRPr/>
                 </a:pPr>
                 <a:r>
-                  <a:rPr lang="en-US" sz="1000" i="1" dirty="0">
+                  <a:rPr lang="en-US" sz="1200" i="1" dirty="0">
                     <a:solidFill>
                       <a:schemeClr val="tx1"/>
                     </a:solidFill>
                   </a:rPr>
-                  <a:t>[] –</a:t>
+                  <a:t>[4] – </a:t>
+                </a:r>
+                <a:r>
+                  <a:rPr lang="en-US" sz="1200" i="1" dirty="0" err="1">
+                    <a:solidFill>
+                      <a:schemeClr val="tx1"/>
+                    </a:solidFill>
+                  </a:rPr>
+                  <a:t>Bettenburg</a:t>
+                </a:r>
+                <a:r>
+                  <a:rPr lang="en-US" sz="1200" i="1" dirty="0">
+                    <a:solidFill>
+                      <a:schemeClr val="tx1"/>
+                    </a:solidFill>
+                  </a:rPr>
+                  <a:t>, N., </a:t>
+                </a:r>
+                <a:r>
+                  <a:rPr lang="en-US" sz="1200" i="1" dirty="0" err="1">
+                    <a:solidFill>
+                      <a:schemeClr val="tx1"/>
+                    </a:solidFill>
+                  </a:rPr>
+                  <a:t>Premraj</a:t>
+                </a:r>
+                <a:r>
+                  <a:rPr lang="en-US" sz="1200" i="1" dirty="0">
+                    <a:solidFill>
+                      <a:schemeClr val="tx1"/>
+                    </a:solidFill>
+                  </a:rPr>
+                  <a:t>, R., Zimmermann, T., Kim, S., 2008. Duplicate Bug Reports Considered Harmful. . .Really? In: ICSM.</a:t>
                 </a:r>
               </a:p>
               <a:p>
@@ -7807,28 +7945,15 @@
                   <a:defRPr/>
                 </a:pPr>
                 <a:r>
-                  <a:rPr lang="en-US" sz="1000" i="1" dirty="0">
+                  <a:rPr lang="en-US" sz="1200" i="1" dirty="0">
                     <a:solidFill>
                       <a:schemeClr val="tx1"/>
                     </a:solidFill>
                   </a:rPr>
-                  <a:t>[] –</a:t>
-                </a:r>
-              </a:p>
-              <a:p>
-                <a:pPr>
-                  <a:defRPr/>
-                </a:pPr>
-                <a:r>
-                  <a:rPr lang="en-US" sz="1000" i="1" dirty="0">
-                    <a:solidFill>
-                      <a:schemeClr val="tx1"/>
-                    </a:solidFill>
-                  </a:rPr>
-                  <a:t>[] – WUYUNTANA, D. and WANG, S. (2018). Distributed Representations of Mongolian Words and Its Efficient Estimation. </a:t>
+                  <a:t>[5] – WUYUNTANA, D. and WANG, S. (2018). Distributed Representations of Mongolian Words and Its Efficient Estimation. </a:t>
                 </a:r>
                 <a:r>
-                  <a:rPr lang="en-US" sz="1000" i="1" dirty="0" err="1">
+                  <a:rPr lang="en-US" sz="1200" i="1" dirty="0" err="1">
                     <a:solidFill>
                       <a:schemeClr val="tx1"/>
                     </a:solidFill>
@@ -7836,7 +7961,7 @@
                   <a:t>DEStech</a:t>
                 </a:r>
                 <a:r>
-                  <a:rPr lang="en-US" sz="1000" i="1" dirty="0">
+                  <a:rPr lang="en-US" sz="1200" i="1" dirty="0">
                     <a:solidFill>
                       <a:schemeClr val="tx1"/>
                     </a:solidFill>
@@ -7844,7 +7969,7 @@
                   <a:t> Transactions on Computer Science and Engineering, (</a:t>
                 </a:r>
                 <a:r>
-                  <a:rPr lang="en-US" sz="1000" i="1" dirty="0" err="1">
+                  <a:rPr lang="en-US" sz="1200" i="1" dirty="0" err="1">
                     <a:solidFill>
                       <a:schemeClr val="tx1"/>
                     </a:solidFill>
@@ -7852,7 +7977,7 @@
                   <a:t>iceit</a:t>
                 </a:r>
                 <a:r>
-                  <a:rPr lang="en-US" sz="1000" i="1" dirty="0">
+                  <a:rPr lang="en-US" sz="1200" i="1" dirty="0">
                     <a:solidFill>
                       <a:schemeClr val="tx1"/>
                     </a:solidFill>
@@ -7880,10 +8005,10 @@
         </p:nvGrpSpPr>
         <p:grpSpPr bwMode="auto">
           <a:xfrm>
-            <a:off x="19218175" y="3257542"/>
-            <a:ext cx="7364837" cy="8020058"/>
-            <a:chOff x="2362200" y="7467600"/>
-            <a:chExt cx="3305829" cy="2671863"/>
+            <a:off x="19137142" y="3057182"/>
+            <a:ext cx="7364837" cy="7750343"/>
+            <a:chOff x="2362200" y="7454400"/>
+            <a:chExt cx="3305829" cy="2685063"/>
           </a:xfrm>
         </p:grpSpPr>
         <p:sp>
@@ -7900,8 +8025,8 @@
           </p:nvSpPr>
           <p:spPr>
             <a:xfrm>
-              <a:off x="2362200" y="7467600"/>
-              <a:ext cx="3305829" cy="2671863"/>
+              <a:off x="2362200" y="7454400"/>
+              <a:ext cx="3305829" cy="2685063"/>
             </a:xfrm>
             <a:prstGeom prst="round2DiagRect">
               <a:avLst/>
@@ -7954,10 +8079,10 @@
           </p:nvGrpSpPr>
           <p:grpSpPr>
             <a:xfrm>
-              <a:off x="2382094" y="7469414"/>
-              <a:ext cx="3285935" cy="902776"/>
-              <a:chOff x="1977726" y="7469414"/>
-              <a:chExt cx="3285935" cy="902776"/>
+              <a:off x="2382094" y="7460239"/>
+              <a:ext cx="3285878" cy="911951"/>
+              <a:chOff x="1977726" y="7460239"/>
+              <a:chExt cx="3285878" cy="911951"/>
             </a:xfrm>
             <a:solidFill>
               <a:schemeClr val="bg1"/>
@@ -7979,15 +8104,26 @@
             </p:nvSpPr>
             <p:spPr>
               <a:xfrm>
-                <a:off x="3554843" y="7469414"/>
-                <a:ext cx="1708818" cy="142092"/>
+                <a:off x="3554786" y="7460239"/>
+                <a:ext cx="1708818" cy="182778"/>
               </a:xfrm>
               <a:prstGeom prst="rect">
                 <a:avLst/>
               </a:prstGeom>
-              <a:solidFill>
-                <a:srgbClr val="558BD2"/>
-              </a:solidFill>
+              <a:gradFill>
+                <a:gsLst>
+                  <a:gs pos="4000">
+                    <a:srgbClr val="394987"/>
+                  </a:gs>
+                  <a:gs pos="0">
+                    <a:srgbClr val="3A4781"/>
+                  </a:gs>
+                  <a:gs pos="62000">
+                    <a:srgbClr val="558BD2"/>
+                  </a:gs>
+                </a:gsLst>
+                <a:lin ang="0" scaled="0"/>
+              </a:gradFill>
               <a:ln>
                 <a:noFill/>
               </a:ln>
@@ -8491,7 +8627,7 @@
                     <a:spcPct val="100000"/>
                   </a:lnSpc>
                   <a:spcBef>
-                    <a:spcPts val="250"/>
+                    <a:spcPts val="900"/>
                   </a:spcBef>
                   <a:defRPr/>
                 </a:pPr>
@@ -8501,7 +8637,7 @@
                       <a:schemeClr val="tx1"/>
                     </a:solidFill>
                   </a:rPr>
-                  <a:t>The architecture chosen is: a 3 wide, 16 high neural, </a:t>
+                  <a:t>The architecture chosen is: a 3 wide, 16 high, </a:t>
                 </a:r>
                 <a:r>
                   <a:rPr lang="en-US" sz="1600" dirty="0" err="1">
@@ -8517,7 +8653,7 @@
                       <a:schemeClr val="tx1"/>
                     </a:solidFill>
                   </a:rPr>
-                  <a:t> activated network with a learning rate of 0.005 and 1,000 backpropagation iterations. At the bottom we list other architectures.</a:t>
+                  <a:t> activated network with a learning rate of 0.005 and 1,000 backpropagation iterations.</a:t>
                 </a:r>
               </a:p>
             </p:txBody>
@@ -8540,7 +8676,7 @@
         </p:nvSpPr>
         <p:spPr bwMode="auto">
           <a:xfrm>
-            <a:off x="23142369" y="4434782"/>
+            <a:off x="23042915" y="4283245"/>
             <a:ext cx="3282477" cy="677108"/>
           </a:xfrm>
           <a:prstGeom prst="rect">
@@ -8834,10 +8970,10 @@
         </p:nvGrpSpPr>
         <p:grpSpPr bwMode="auto">
           <a:xfrm>
-            <a:off x="1054509" y="7793755"/>
-            <a:ext cx="13019467" cy="5846044"/>
-            <a:chOff x="2014357" y="7473687"/>
-            <a:chExt cx="3258683" cy="1666384"/>
+            <a:off x="1045863" y="7793759"/>
+            <a:ext cx="13028113" cy="5815011"/>
+            <a:chOff x="2012193" y="7473687"/>
+            <a:chExt cx="3260847" cy="1657538"/>
           </a:xfrm>
           <a:solidFill>
             <a:schemeClr val="bg1"/>
@@ -9072,7 +9208,7 @@
                 <a:defRPr/>
               </a:pPr>
               <a:r>
-                <a:rPr lang="en-US" sz="1778" dirty="0">
+                <a:rPr lang="en-US" sz="1700" dirty="0">
                   <a:ln w="0"/>
                   <a:solidFill>
                     <a:schemeClr val="bg1"/>
@@ -9088,7 +9224,7 @@
                   <a:ea typeface="Tahoma" panose="020B0604030504040204" pitchFamily="34" charset="0"/>
                   <a:cs typeface="Tahoma" panose="020B0604030504040204" pitchFamily="34" charset="0"/>
                 </a:rPr>
-                <a:t>Features, Models and Results</a:t>
+                <a:t>FEATURES, MODELS &amp; RESULTS</a:t>
               </a:r>
             </a:p>
           </p:txBody>
@@ -9111,8 +9247,8 @@
               </p:nvSpPr>
               <p:spPr>
                 <a:xfrm>
-                  <a:off x="2014357" y="7710452"/>
-                  <a:ext cx="3206485" cy="1429619"/>
+                  <a:off x="2012193" y="7660963"/>
+                  <a:ext cx="3206485" cy="1470262"/>
                 </a:xfrm>
                 <a:prstGeom prst="rect">
                   <a:avLst/>
@@ -9328,7 +9464,7 @@
                       <a:latin typeface="Calibri" panose="020F0502020204030204" pitchFamily="34" charset="0"/>
                       <a:cs typeface="Calibri" panose="020F0502020204030204" pitchFamily="34" charset="0"/>
                     </a:rPr>
-                    <a:t>The input data described in the data set section was parsed into a bag of words, multinomial event model representation. The words are assumed to be independent and chosen with separate distributions at create time. During the preprocessing step we have a a list of important keywords that are added as features by default, a list of stop words that are ignored and a frequency threshold of &gt;= 5 when building multinomial vector. While developing our solution we make the following assumptions: </a:t>
+                    <a:t>The input data described in the data set section was parsed into a bag of words, multinomial event model representation. The words are assumed to be independent and chosen with separate distributions at create time. During the preprocessing step we capture the list of frequent words at a  threshold of &gt;= 5 when building multinomial vector.  While developing our solution we make the following assumptions: </a:t>
                   </a:r>
                 </a:p>
                 <a:p>
@@ -10094,7 +10230,7 @@
                       <a:latin typeface="Calibri" panose="020F0502020204030204" pitchFamily="34" charset="0"/>
                       <a:cs typeface="Calibri" panose="020F0502020204030204" pitchFamily="34" charset="0"/>
                     </a:rPr>
-                    <a:t>/&gt; Tickets are composed of independently and identically distributed words chosen at random (naive Bayes assumption) and words from a multinomial distribution:			</a:t>
+                    <a:t>/&gt; Tickets are composed of independently and identically distributed words chosen at random (naive Bayes assumption) and from a multinomial distribution:			</a:t>
                   </a:r>
                   <a:r>
                     <a:rPr lang="x-none" sz="1600">
@@ -10457,7 +10593,68 @@
                       <a:latin typeface="Calibri" panose="020F0502020204030204" pitchFamily="34" charset="0"/>
                       <a:cs typeface="Calibri" panose="020F0502020204030204" pitchFamily="34" charset="0"/>
                     </a:rPr>
-                    <a:t>Lastly, the labels are built based on developers we have seen before represented as ENUM integers. Based on these foundations, we create a matrix a multinomial input vector and an integer class label representing assignee. </a:t>
+                    <a:t>The labels are developers we have seen before represented as integers. We then create a matrix a multinomial input vector and an integer class label representing assignee to train and test. NB and SVM are not investigated by this paper but have been added </a:t>
+                  </a:r>
+                  <a:r>
+                    <a:rPr lang="en-US" sz="1600" u="sng" dirty="0">
+                      <a:solidFill>
+                        <a:schemeClr val="tx1"/>
+                      </a:solidFill>
+                      <a:latin typeface="Calibri" panose="020F0502020204030204" pitchFamily="34" charset="0"/>
+                      <a:cs typeface="Calibri" panose="020F0502020204030204" pitchFamily="34" charset="0"/>
+                    </a:rPr>
+                    <a:t>only</a:t>
+                  </a:r>
+                  <a:r>
+                    <a:rPr lang="en-US" sz="1600" dirty="0">
+                      <a:solidFill>
+                        <a:schemeClr val="tx1"/>
+                      </a:solidFill>
+                      <a:latin typeface="Calibri" panose="020F0502020204030204" pitchFamily="34" charset="0"/>
+                      <a:cs typeface="Calibri" panose="020F0502020204030204" pitchFamily="34" charset="0"/>
+                    </a:rPr>
+                    <a:t> for reference. </a:t>
+                  </a:r>
+                </a:p>
+                <a:p>
+                  <a:pPr>
+                    <a:lnSpc>
+                      <a:spcPct val="100000"/>
+                    </a:lnSpc>
+                    <a:spcBef>
+                      <a:spcPts val="250"/>
+                    </a:spcBef>
+                    <a:defRPr/>
+                  </a:pPr>
+                  <a:r>
+                    <a:rPr lang="en-US" sz="1600" dirty="0">
+                      <a:solidFill>
+                        <a:schemeClr val="tx1"/>
+                      </a:solidFill>
+                      <a:latin typeface="Calibri" panose="020F0502020204030204" pitchFamily="34" charset="0"/>
+                      <a:cs typeface="Calibri" panose="020F0502020204030204" pitchFamily="34" charset="0"/>
+                    </a:rPr>
+                    <a:t>The total datasets after vectorizing were: 559 LinkedIn m x n =&lt;559, 2936&gt;     while the </a:t>
+                  </a:r>
+                  <a:r>
+                    <a:rPr lang="en-US" sz="1600" dirty="0" err="1">
+                      <a:solidFill>
+                        <a:schemeClr val="tx1"/>
+                      </a:solidFill>
+                      <a:latin typeface="Calibri" panose="020F0502020204030204" pitchFamily="34" charset="0"/>
+                      <a:cs typeface="Calibri" panose="020F0502020204030204" pitchFamily="34" charset="0"/>
+                    </a:rPr>
+                    <a:t>expium</a:t>
+                  </a:r>
+                  <a:r>
+                    <a:rPr lang="en-US" sz="1600" dirty="0">
+                      <a:solidFill>
+                        <a:schemeClr val="tx1"/>
+                      </a:solidFill>
+                      <a:latin typeface="Calibri" panose="020F0502020204030204" pitchFamily="34" charset="0"/>
+                      <a:cs typeface="Calibri" panose="020F0502020204030204" pitchFamily="34" charset="0"/>
+                    </a:rPr>
+                    <a:t> dataset m x n :  &lt;5435, 1970&gt;</a:t>
                   </a:r>
                 </a:p>
                 <a:p>
@@ -10557,7 +10754,39 @@
                         <a:schemeClr val="tx1"/>
                       </a:solidFill>
                     </a:rPr>
-                    <a:t> for back prop.  The network is trained and tested with an 80% / 20% train to test split, initial attempts at 5 fold validation proved too time consuming.  </a:t>
+                    <a:t> for backpropagation. The network is trained and tested using a </a:t>
+                  </a:r>
+                  <a:r>
+                    <a:rPr lang="en-US" sz="1600" dirty="0" err="1">
+                      <a:solidFill>
+                        <a:schemeClr val="tx1"/>
+                      </a:solidFill>
+                    </a:rPr>
+                    <a:t>kFold</a:t>
+                  </a:r>
+                  <a:r>
+                    <a:rPr lang="en-US" sz="1600" dirty="0">
+                      <a:solidFill>
+                        <a:schemeClr val="tx1"/>
+                      </a:solidFill>
+                    </a:rPr>
+                    <a:t> cross validation similar to the work by </a:t>
+                  </a:r>
+                  <a:r>
+                    <a:rPr lang="en-US" sz="1600" dirty="0" err="1">
+                      <a:solidFill>
+                        <a:schemeClr val="tx1"/>
+                      </a:solidFill>
+                    </a:rPr>
+                    <a:t>Bettenburg</a:t>
+                  </a:r>
+                  <a:r>
+                    <a:rPr lang="en-US" sz="1600" dirty="0">
+                      <a:solidFill>
+                        <a:schemeClr val="tx1"/>
+                      </a:solidFill>
+                    </a:rPr>
+                    <a:t> et al. </a:t>
                   </a:r>
                 </a:p>
                 <a:p>
@@ -10597,24 +10826,8 @@
                       <a:latin typeface="Calibri" panose="020F0502020204030204" pitchFamily="34" charset="0"/>
                       <a:cs typeface="Calibri" panose="020F0502020204030204" pitchFamily="34" charset="0"/>
                     </a:rPr>
-                    <a:t>Blow we demonstrate the results of the experiments conducted</a:t>
+                    <a:t>Blow are the results of the experiments conducted on March 2018 tickets, larger compute/optimization is required to run full dataset.</a:t>
                   </a:r>
-                  <a:endParaRPr lang="en-US" sz="1600" b="1" u="sng" dirty="0">
-                    <a:solidFill>
-                      <a:schemeClr val="tx1"/>
-                    </a:solidFill>
-                  </a:endParaRPr>
-                </a:p>
-                <a:p>
-                  <a:pPr>
-                    <a:lnSpc>
-                      <a:spcPct val="100000"/>
-                    </a:lnSpc>
-                    <a:spcBef>
-                      <a:spcPts val="250"/>
-                    </a:spcBef>
-                    <a:defRPr/>
-                  </a:pPr>
                   <a:endParaRPr lang="en-US" sz="1600" dirty="0">
                     <a:solidFill>
                       <a:schemeClr val="tx1"/>
@@ -10641,16 +10854,16 @@
               </p:nvSpPr>
               <p:spPr>
                 <a:xfrm>
-                  <a:off x="2014357" y="7710452"/>
-                  <a:ext cx="3206485" cy="1429619"/>
+                  <a:off x="2012193" y="7660963"/>
+                  <a:ext cx="3206485" cy="1470262"/>
                 </a:xfrm>
                 <a:prstGeom prst="rect">
                   <a:avLst/>
                 </a:prstGeom>
                 <a:blipFill>
-                  <a:blip r:embed="rId8"/>
+                  <a:blip r:embed="rId9"/>
                   <a:stretch>
-                    <a:fillRect b="-9343"/>
+                    <a:fillRect b="-2206"/>
                   </a:stretch>
                 </a:blipFill>
                 <a:ln>
@@ -10689,8 +10902,8 @@
         </p:nvSpPr>
         <p:spPr bwMode="auto">
           <a:xfrm>
-            <a:off x="1105417" y="16136572"/>
-            <a:ext cx="12691816" cy="1203742"/>
+            <a:off x="1045863" y="15746836"/>
+            <a:ext cx="12691816" cy="2105347"/>
           </a:xfrm>
           <a:prstGeom prst="rect">
             <a:avLst/>
@@ -10904,7 +11117,7 @@
                   <a:schemeClr val="tx1"/>
                 </a:solidFill>
               </a:rPr>
-              <a:t>One acceptable point is that a developer that has never been assigned a ticket will not be considered during prediction, this is similar to </a:t>
+              <a:t>- The highly non-linear nature of DNN has allowed almost perfect 5Fold mean accuracy on over 3,000 LinkedIn tickets and 5,500 generated tickets, that same benefit has heavily overfit the data as observed by the dismal &lt;7% test prediction accuracy. </a:t>
             </a:r>
           </a:p>
           <a:p>
@@ -10923,7 +11136,7 @@
                   <a:schemeClr val="tx1"/>
                 </a:solidFill>
               </a:rPr>
-              <a:t>The highly non-l</a:t>
+              <a:t>- Computational challenges with vectorizing text has prevented us from significantly scaling the number of trained samples, working on a batching solution to count words efficiently, store to a datastore and fetch on batched training and prediction stages. </a:t>
             </a:r>
           </a:p>
           <a:p>
@@ -10931,8 +11144,38 @@
               <a:lnSpc>
                 <a:spcPct val="100000"/>
               </a:lnSpc>
+              <a:spcBef>
+                <a:spcPts val="250"/>
+              </a:spcBef>
               <a:defRPr/>
             </a:pPr>
+            <a:r>
+              <a:rPr lang="en-US" sz="1600" dirty="0">
+                <a:solidFill>
+                  <a:schemeClr val="tx1"/>
+                </a:solidFill>
+              </a:rPr>
+              <a:t>- A developer that has never been assigned a ticket will not be considered during prediction, this is normal in triaging. </a:t>
+            </a:r>
+          </a:p>
+          <a:p>
+            <a:pPr>
+              <a:lnSpc>
+                <a:spcPct val="100000"/>
+              </a:lnSpc>
+              <a:spcBef>
+                <a:spcPts val="250"/>
+              </a:spcBef>
+              <a:defRPr/>
+            </a:pPr>
+            <a:r>
+              <a:rPr lang="en-US" sz="1600" dirty="0">
+                <a:solidFill>
+                  <a:schemeClr val="tx1"/>
+                </a:solidFill>
+              </a:rPr>
+              <a:t>- While Linkedin NB and SVM 1.0 accuracy seems surprising, one can easily intuit  the cause being n&gt;&gt; m. </a:t>
+            </a:r>
             <a:endParaRPr lang="en-US" sz="1333" dirty="0">
               <a:solidFill>
                 <a:schemeClr val="tx1"/>
@@ -10955,7 +11198,7 @@
         </p:nvGrpSpPr>
         <p:grpSpPr>
           <a:xfrm>
-            <a:off x="14611541" y="3012338"/>
+            <a:off x="14520325" y="3057184"/>
             <a:ext cx="4186244" cy="15181552"/>
             <a:chOff x="14510140" y="3000689"/>
             <a:chExt cx="4186244" cy="15181552"/>
@@ -10976,7 +11219,7 @@
             <p:nvPr/>
           </p:nvPicPr>
           <p:blipFill rotWithShape="1">
-            <a:blip r:embed="rId9">
+            <a:blip r:embed="rId10">
               <a:extLst>
                 <a:ext uri="{28A0092B-C50C-407E-A947-70E740481C1C}">
                   <a14:useLocalDpi xmlns:a14="http://schemas.microsoft.com/office/drawing/2010/main" val="0"/>
@@ -11011,7 +11254,7 @@
             <p:nvPr/>
           </p:nvPicPr>
           <p:blipFill rotWithShape="1">
-            <a:blip r:embed="rId9">
+            <a:blip r:embed="rId10">
               <a:extLst>
                 <a:ext uri="{28A0092B-C50C-407E-A947-70E740481C1C}">
                   <a14:useLocalDpi xmlns:a14="http://schemas.microsoft.com/office/drawing/2010/main" val="0"/>
@@ -11046,7 +11289,7 @@
             <p:nvPr/>
           </p:nvPicPr>
           <p:blipFill rotWithShape="1">
-            <a:blip r:embed="rId9">
+            <a:blip r:embed="rId10">
               <a:extLst>
                 <a:ext uri="{28A0092B-C50C-407E-A947-70E740481C1C}">
                   <a14:useLocalDpi xmlns:a14="http://schemas.microsoft.com/office/drawing/2010/main" val="0"/>
@@ -11081,10 +11324,10 @@
         </p:nvGrpSpPr>
         <p:grpSpPr>
           <a:xfrm>
-            <a:off x="19221283" y="11665442"/>
-            <a:ext cx="7364837" cy="3419751"/>
-            <a:chOff x="19220677" y="11650290"/>
-            <a:chExt cx="7364837" cy="3419751"/>
+            <a:off x="19137016" y="11247608"/>
+            <a:ext cx="7364836" cy="3574561"/>
+            <a:chOff x="19220677" y="11650287"/>
+            <a:chExt cx="7372517" cy="3419754"/>
           </a:xfrm>
         </p:grpSpPr>
         <p:sp>
@@ -11155,10 +11398,10 @@
           </p:nvGrpSpPr>
           <p:grpSpPr bwMode="auto">
             <a:xfrm>
-              <a:off x="19363086" y="11650290"/>
-              <a:ext cx="7219925" cy="3419751"/>
-              <a:chOff x="1972288" y="7498654"/>
-              <a:chExt cx="3240783" cy="2742426"/>
+              <a:off x="19261889" y="11650287"/>
+              <a:ext cx="7331305" cy="3382366"/>
+              <a:chOff x="1926864" y="7498653"/>
+              <a:chExt cx="3290778" cy="2712446"/>
             </a:xfrm>
             <a:solidFill>
               <a:schemeClr val="bg1"/>
@@ -11180,15 +11423,26 @@
             </p:nvSpPr>
             <p:spPr>
               <a:xfrm>
-                <a:off x="3517064" y="7498654"/>
-                <a:ext cx="1696007" cy="446340"/>
+                <a:off x="3517064" y="7498653"/>
+                <a:ext cx="1696007" cy="420920"/>
               </a:xfrm>
               <a:prstGeom prst="rect">
                 <a:avLst/>
               </a:prstGeom>
-              <a:solidFill>
-                <a:srgbClr val="558BD2"/>
-              </a:solidFill>
+              <a:gradFill>
+                <a:gsLst>
+                  <a:gs pos="4000">
+                    <a:srgbClr val="394987"/>
+                  </a:gs>
+                  <a:gs pos="0">
+                    <a:srgbClr val="3A4781"/>
+                  </a:gs>
+                  <a:gs pos="62000">
+                    <a:srgbClr val="558BD2"/>
+                  </a:gs>
+                </a:gsLst>
+                <a:lin ang="0" scaled="0"/>
+              </a:gradFill>
               <a:ln>
                 <a:noFill/>
               </a:ln>
@@ -11419,8 +11673,8 @@
             </p:nvSpPr>
             <p:spPr>
               <a:xfrm>
-                <a:off x="1972288" y="7970810"/>
-                <a:ext cx="3223768" cy="2270270"/>
+                <a:off x="1926864" y="7940828"/>
+                <a:ext cx="3290778" cy="2270271"/>
               </a:xfrm>
               <a:prstGeom prst="rect">
                 <a:avLst/>
@@ -11623,7 +11877,7 @@
                       <a:schemeClr val="tx1"/>
                     </a:solidFill>
                   </a:rPr>
-                  <a:t>The initial results of our experiment resulted in poor accuracy on the test set. The DNN is able to model highly non-linear models but even with a dataset of &lt;&gt; tickets, the test set still performed poorly. </a:t>
+                  <a:t>The initial results of our experiments resulted in poor accuracy on the test set. The DNN overfit the small dataset and we hope that after running on full set (~9x more tickets) the test accuracy will dramatically increase, currently experiments have only been applied to a set of 5,000 tickets</a:t>
                 </a:r>
               </a:p>
               <a:p>
@@ -11650,7 +11904,23 @@
                       <a:schemeClr val="tx1"/>
                     </a:solidFill>
                   </a:rPr>
-                  <a:t> Parameter search on the LinkedIn dataset though computationally expensive could improve our model capabilities</a:t>
+                  <a:t> The most important work is to implement </a:t>
+                </a:r>
+                <a:r>
+                  <a:rPr lang="en-US" sz="1600" b="1" dirty="0">
+                    <a:solidFill>
+                      <a:schemeClr val="tx1"/>
+                    </a:solidFill>
+                  </a:rPr>
+                  <a:t>dropout</a:t>
+                </a:r>
+                <a:r>
+                  <a:rPr lang="en-US" sz="1600" dirty="0">
+                    <a:solidFill>
+                      <a:schemeClr val="tx1"/>
+                    </a:solidFill>
+                  </a:rPr>
+                  <a:t> to fix overfit.</a:t>
                 </a:r>
               </a:p>
               <a:p>
@@ -11690,7 +11960,7 @@
                       <a:schemeClr val="tx1"/>
                     </a:solidFill>
                   </a:rPr>
-                  <a:t>The current algorithm does not take advantage of NLP concepts, a great extension of this work would be to implement stemming, lemmatization, Word2Vec and word embeddings. </a:t>
+                  <a:t>Take advantage of NLP concepts to improve test accuracy, implementing  stemming, lemmatization, Word2Vec and word embeddings. </a:t>
                 </a:r>
               </a:p>
               <a:p>
@@ -11712,6 +11982,27 @@
                     </a:solidFill>
                   </a:rPr>
                   <a:t>Utilize additional features such as: watchers, labels, reporter, hashed exceptions and so on. </a:t>
+                </a:r>
+              </a:p>
+              <a:p>
+                <a:pPr marL="285750" indent="-285750">
+                  <a:lnSpc>
+                    <a:spcPct val="100000"/>
+                  </a:lnSpc>
+                  <a:spcBef>
+                    <a:spcPts val="0"/>
+                  </a:spcBef>
+                  <a:buFont typeface="Arial" panose="020B0604020202020204" pitchFamily="34" charset="0"/>
+                  <a:buChar char="•"/>
+                  <a:defRPr/>
+                </a:pPr>
+                <a:r>
+                  <a:rPr lang="en-US" sz="1600" dirty="0">
+                    <a:solidFill>
+                      <a:schemeClr val="tx1"/>
+                    </a:solidFill>
+                  </a:rPr>
+                  <a:t>Make the vectorization process cacheable to handle entire dataset. </a:t>
                 </a:r>
               </a:p>
               <a:p>
@@ -11749,7 +12040,7 @@
           <p:nvPr/>
         </p:nvPicPr>
         <p:blipFill rotWithShape="1">
-          <a:blip r:embed="rId10">
+          <a:blip r:embed="rId11">
             <a:extLst>
               <a:ext uri="{28A0092B-C50C-407E-A947-70E740481C1C}">
                 <a14:useLocalDpi xmlns:a14="http://schemas.microsoft.com/office/drawing/2010/main" val="0"/>
@@ -11761,43 +12052,8 @@
         </p:blipFill>
         <p:spPr>
           <a:xfrm>
-            <a:off x="21488686" y="9410339"/>
+            <a:off x="21520957" y="8995556"/>
             <a:ext cx="2405200" cy="1729171"/>
-          </a:xfrm>
-          <a:prstGeom prst="rect">
-            <a:avLst/>
-          </a:prstGeom>
-        </p:spPr>
-      </p:pic>
-      <p:pic>
-        <p:nvPicPr>
-          <p:cNvPr id="48" name="Picture 47">
-            <a:extLst>
-              <a:ext uri="{FF2B5EF4-FFF2-40B4-BE49-F238E27FC236}">
-                <a16:creationId xmlns:a16="http://schemas.microsoft.com/office/drawing/2014/main" id="{C60FB99F-538A-0544-BD08-6496FFDECF1F}"/>
-              </a:ext>
-            </a:extLst>
-          </p:cNvPr>
-          <p:cNvPicPr>
-            <a:picLocks noChangeAspect="1"/>
-          </p:cNvPicPr>
-          <p:nvPr/>
-        </p:nvPicPr>
-        <p:blipFill rotWithShape="1">
-          <a:blip r:embed="rId11">
-            <a:extLst>
-              <a:ext uri="{28A0092B-C50C-407E-A947-70E740481C1C}">
-                <a14:useLocalDpi xmlns:a14="http://schemas.microsoft.com/office/drawing/2010/main" val="0"/>
-              </a:ext>
-            </a:extLst>
-          </a:blip>
-          <a:srcRect l="5964" t="4762" r="8597"/>
-          <a:stretch/>
-        </p:blipFill>
-        <p:spPr>
-          <a:xfrm>
-            <a:off x="19388805" y="5735816"/>
-            <a:ext cx="4505081" cy="3766311"/>
           </a:xfrm>
           <a:prstGeom prst="rect">
             <a:avLst/>
@@ -11820,8 +12076,8 @@
         </p:nvSpPr>
         <p:spPr bwMode="auto">
           <a:xfrm>
-            <a:off x="23900481" y="6649833"/>
-            <a:ext cx="2603104" cy="2154436"/>
+            <a:off x="23481944" y="6127353"/>
+            <a:ext cx="2754610" cy="2154436"/>
           </a:xfrm>
           <a:prstGeom prst="rect">
             <a:avLst/>
@@ -12018,7 +12274,7 @@
                   <a:schemeClr val="tx1"/>
                 </a:solidFill>
               </a:rPr>
-              <a:t>      The architecture is chosen due to the smooth descent and relative simplicity of the network compared to the higher train accuracy achieved by the architectures below.</a:t>
+              <a:t>      * The architecture is chosen due to the fast and smooth descent and relative simplicity of the network compared to the higher train but lower test accuracy architectures below.</a:t>
             </a:r>
           </a:p>
         </p:txBody>
@@ -12038,14 +12294,14 @@
           <p:nvPr>
             <p:extLst>
               <p:ext uri="{D42A27DB-BD31-4B8C-83A1-F6EECF244321}">
-                <p14:modId xmlns:p14="http://schemas.microsoft.com/office/powerpoint/2010/main" val="1593134685"/>
+                <p14:modId xmlns:p14="http://schemas.microsoft.com/office/powerpoint/2010/main" val="1805633729"/>
               </p:ext>
             </p:extLst>
           </p:nvPr>
         </p:nvGraphicFramePr>
         <p:xfrm>
-          <a:off x="1523999" y="14033813"/>
-          <a:ext cx="11808935" cy="2102759"/>
+          <a:off x="1444637" y="13687267"/>
+          <a:ext cx="11808935" cy="2105347"/>
         </p:xfrm>
         <a:graphic>
           <a:graphicData uri="http://schemas.openxmlformats.org/drawingml/2006/table">
@@ -12061,28 +12317,28 @@
                     </a:ext>
                   </a:extLst>
                 </a:gridCol>
-                <a:gridCol w="1896099">
+                <a:gridCol w="2201726">
                   <a:extLst>
                     <a:ext uri="{9D8B030D-6E8A-4147-A177-3AD203B41FA5}">
                       <a16:colId xmlns:a16="http://schemas.microsoft.com/office/drawing/2014/main" val="3371112526"/>
                     </a:ext>
                   </a:extLst>
                 </a:gridCol>
-                <a:gridCol w="2361787">
+                <a:gridCol w="2438400">
                   <a:extLst>
                     <a:ext uri="{9D8B030D-6E8A-4147-A177-3AD203B41FA5}">
                       <a16:colId xmlns:a16="http://schemas.microsoft.com/office/drawing/2014/main" val="3705095373"/>
                     </a:ext>
                   </a:extLst>
                 </a:gridCol>
-                <a:gridCol w="2361787">
+                <a:gridCol w="1831962">
                   <a:extLst>
                     <a:ext uri="{9D8B030D-6E8A-4147-A177-3AD203B41FA5}">
                       <a16:colId xmlns:a16="http://schemas.microsoft.com/office/drawing/2014/main" val="2326900635"/>
                     </a:ext>
                   </a:extLst>
                 </a:gridCol>
-                <a:gridCol w="2361787">
+                <a:gridCol w="2509372">
                   <a:extLst>
                     <a:ext uri="{9D8B030D-6E8A-4147-A177-3AD203B41FA5}">
                       <a16:colId xmlns:a16="http://schemas.microsoft.com/office/drawing/2014/main" val="2621933109"/>
@@ -12090,7 +12346,7 @@
                   </a:extLst>
                 </a:gridCol>
               </a:tblGrid>
-              <a:tr h="639719">
+              <a:tr h="520387">
                 <a:tc rowSpan="2">
                   <a:txBody>
                     <a:bodyPr/>
@@ -12110,7 +12366,13 @@
                       </a:r>
                     </a:p>
                   </a:txBody>
-                  <a:tcPr anchor="ctr"/>
+                  <a:tcPr anchor="ctr">
+                    <a:solidFill>
+                      <a:schemeClr val="bg2">
+                        <a:lumMod val="75000"/>
+                      </a:schemeClr>
+                    </a:solidFill>
+                  </a:tcPr>
                 </a:tc>
                 <a:tc gridSpan="2">
                   <a:txBody>
@@ -12127,11 +12389,17 @@
                           <a:ea typeface="+mn-ea"/>
                           <a:cs typeface="+mn-cs"/>
                         </a:rPr>
-                        <a:t>Linkedin Dataset</a:t>
+                        <a:t>Linkedin Dataset (559/43483)</a:t>
                       </a:r>
                     </a:p>
                   </a:txBody>
-                  <a:tcPr anchor="ctr"/>
+                  <a:tcPr anchor="ctr">
+                    <a:solidFill>
+                      <a:schemeClr val="bg2">
+                        <a:lumMod val="75000"/>
+                      </a:schemeClr>
+                    </a:solidFill>
+                  </a:tcPr>
                 </a:tc>
                 <a:tc hMerge="1">
                   <a:txBody>
@@ -12169,7 +12437,13 @@
                       </a:r>
                     </a:p>
                   </a:txBody>
-                  <a:tcPr anchor="ctr"/>
+                  <a:tcPr anchor="ctr">
+                    <a:solidFill>
+                      <a:schemeClr val="bg2">
+                        <a:lumMod val="75000"/>
+                      </a:schemeClr>
+                    </a:solidFill>
+                  </a:tcPr>
                 </a:tc>
                 <a:tc hMerge="1">
                   <a:txBody>
@@ -12194,7 +12468,7 @@
                   </a:ext>
                 </a:extLst>
               </a:tr>
-              <a:tr h="457200">
+              <a:tr h="304800">
                 <a:tc vMerge="1">
                   <a:txBody>
                     <a:bodyPr/>
@@ -12227,7 +12501,7 @@
                           <a:ea typeface="+mn-ea"/>
                           <a:cs typeface="+mn-cs"/>
                         </a:rPr>
-                        <a:t>Train Performance</a:t>
+                        <a:t>Train Accuracy</a:t>
                       </a:r>
                     </a:p>
                   </a:txBody>
@@ -12248,7 +12522,7 @@
                           <a:ea typeface="+mn-ea"/>
                           <a:cs typeface="+mn-cs"/>
                         </a:rPr>
-                        <a:t>Test Performance</a:t>
+                        <a:t>Test Accuracy</a:t>
                       </a:r>
                     </a:p>
                   </a:txBody>
@@ -12317,7 +12591,20 @@
                           <a:ea typeface="+mn-ea"/>
                           <a:cs typeface="+mn-cs"/>
                         </a:rPr>
-                        <a:t>SVM Classifier (linear kernel)</a:t>
+                        <a:t>SVM Classifier </a:t>
+                      </a:r>
+                    </a:p>
+                    <a:p>
+                      <a:r>
+                        <a:rPr lang="en-US" sz="1600" b="0" kern="1200" dirty="0">
+                          <a:solidFill>
+                            <a:schemeClr val="tx1"/>
+                          </a:solidFill>
+                          <a:latin typeface="+mn-lt"/>
+                          <a:ea typeface="+mn-ea"/>
+                          <a:cs typeface="+mn-cs"/>
+                        </a:rPr>
+                        <a:t>(linear kernel, hinge loss)</a:t>
                       </a:r>
                     </a:p>
                   </a:txBody>
@@ -12327,6 +12614,36 @@
                   <a:txBody>
                     <a:bodyPr/>
                     <a:lstStyle/>
+                    <a:p>
+                      <a:pPr marL="0" marR="0" lvl="0" indent="0" algn="l" defTabSz="2264388" rtl="0" eaLnBrk="1" fontAlgn="auto" latinLnBrk="0" hangingPunct="1">
+                        <a:lnSpc>
+                          <a:spcPct val="100000"/>
+                        </a:lnSpc>
+                        <a:spcBef>
+                          <a:spcPts val="0"/>
+                        </a:spcBef>
+                        <a:spcAft>
+                          <a:spcPts val="0"/>
+                        </a:spcAft>
+                        <a:buClrTx/>
+                        <a:buSzTx/>
+                        <a:buFontTx/>
+                        <a:buNone/>
+                        <a:tabLst/>
+                        <a:defRPr/>
+                      </a:pPr>
+                      <a:r>
+                        <a:rPr lang="en-US" sz="1600" b="0" kern="1200" dirty="0">
+                          <a:solidFill>
+                            <a:schemeClr val="tx1"/>
+                          </a:solidFill>
+                          <a:latin typeface="+mn-lt"/>
+                          <a:ea typeface="+mn-ea"/>
+                          <a:cs typeface="+mn-cs"/>
+                        </a:rPr>
+                        <a:t>1.0 w/ 70% train</a:t>
+                      </a:r>
+                    </a:p>
                     <a:p>
                       <a:endParaRPr lang="en-US" sz="1600" b="0" kern="1200" dirty="0">
                         <a:solidFill>
@@ -12345,22 +12662,35 @@
                     <a:bodyPr/>
                     <a:lstStyle/>
                     <a:p>
-                      <a:endParaRPr lang="en-US" sz="1600" b="0" kern="1200" dirty="0">
-                        <a:solidFill>
-                          <a:schemeClr val="tx1"/>
-                        </a:solidFill>
-                        <a:latin typeface="+mn-lt"/>
-                        <a:ea typeface="+mn-ea"/>
-                        <a:cs typeface="+mn-cs"/>
-                      </a:endParaRPr>
+                      <a:pPr marL="0" marR="0" lvl="0" indent="0" algn="l" defTabSz="2264388" rtl="0" eaLnBrk="1" fontAlgn="auto" latinLnBrk="0" hangingPunct="1">
+                        <a:lnSpc>
+                          <a:spcPct val="100000"/>
+                        </a:lnSpc>
+                        <a:spcBef>
+                          <a:spcPts val="0"/>
+                        </a:spcBef>
+                        <a:spcAft>
+                          <a:spcPts val="0"/>
+                        </a:spcAft>
+                        <a:buClrTx/>
+                        <a:buSzTx/>
+                        <a:buFontTx/>
+                        <a:buNone/>
+                        <a:tabLst/>
+                        <a:defRPr/>
+                      </a:pPr>
+                      <a:r>
+                        <a:rPr lang="en-US" sz="1600" b="0" kern="1200" dirty="0">
+                          <a:solidFill>
+                            <a:schemeClr val="tx1"/>
+                          </a:solidFill>
+                          <a:latin typeface="+mn-lt"/>
+                          <a:ea typeface="+mn-ea"/>
+                          <a:cs typeface="+mn-cs"/>
+                        </a:rPr>
+                        <a:t>1.0 w/ 30% test</a:t>
+                      </a:r>
                     </a:p>
-                  </a:txBody>
-                  <a:tcPr/>
-                </a:tc>
-                <a:tc>
-                  <a:txBody>
-                    <a:bodyPr/>
-                    <a:lstStyle/>
                     <a:p>
                       <a:endParaRPr lang="en-US" sz="1600" b="0" kern="1200" dirty="0">
                         <a:solidFill>
@@ -12379,14 +12709,37 @@
                     <a:bodyPr/>
                     <a:lstStyle/>
                     <a:p>
-                      <a:endParaRPr lang="en-US" sz="1600" b="0" kern="1200" dirty="0">
-                        <a:solidFill>
-                          <a:schemeClr val="tx1"/>
-                        </a:solidFill>
-                        <a:latin typeface="+mn-lt"/>
-                        <a:ea typeface="+mn-ea"/>
-                        <a:cs typeface="+mn-cs"/>
-                      </a:endParaRPr>
+                      <a:r>
+                        <a:rPr lang="en-US" sz="1600" b="0" kern="1200" dirty="0">
+                          <a:solidFill>
+                            <a:schemeClr val="tx1"/>
+                          </a:solidFill>
+                          <a:latin typeface="+mn-lt"/>
+                          <a:ea typeface="+mn-ea"/>
+                          <a:cs typeface="+mn-cs"/>
+                        </a:rPr>
+                        <a:t>1.0 w/ 30% train</a:t>
+                      </a:r>
+                    </a:p>
+                  </a:txBody>
+                  <a:tcPr/>
+                </a:tc>
+                <a:tc>
+                  <a:txBody>
+                    <a:bodyPr/>
+                    <a:lstStyle/>
+                    <a:p>
+                      <a:r>
+                        <a:rPr lang="en-US" sz="1600" b="0" kern="1200" dirty="0">
+                          <a:solidFill>
+                            <a:schemeClr val="tx1"/>
+                          </a:solidFill>
+                          <a:latin typeface="+mn-lt"/>
+                          <a:ea typeface="+mn-ea"/>
+                          <a:cs typeface="+mn-cs"/>
+                        </a:rPr>
+                        <a:t>1.0 w/o 30% test</a:t>
+                      </a:r>
                     </a:p>
                   </a:txBody>
                   <a:tcPr/>
@@ -12423,14 +12776,34 @@
                     <a:bodyPr/>
                     <a:lstStyle/>
                     <a:p>
-                      <a:endParaRPr lang="en-US" sz="1600" b="0" kern="1200" dirty="0">
-                        <a:solidFill>
-                          <a:schemeClr val="tx1"/>
-                        </a:solidFill>
-                        <a:latin typeface="+mn-lt"/>
-                        <a:ea typeface="+mn-ea"/>
-                        <a:cs typeface="+mn-cs"/>
-                      </a:endParaRPr>
+                      <a:pPr marL="0" marR="0" lvl="0" indent="0" algn="l" defTabSz="2264388" rtl="0" eaLnBrk="1" fontAlgn="auto" latinLnBrk="0" hangingPunct="1">
+                        <a:lnSpc>
+                          <a:spcPct val="100000"/>
+                        </a:lnSpc>
+                        <a:spcBef>
+                          <a:spcPts val="0"/>
+                        </a:spcBef>
+                        <a:spcAft>
+                          <a:spcPts val="0"/>
+                        </a:spcAft>
+                        <a:buClrTx/>
+                        <a:buSzTx/>
+                        <a:buFontTx/>
+                        <a:buNone/>
+                        <a:tabLst/>
+                        <a:defRPr/>
+                      </a:pPr>
+                      <a:r>
+                        <a:rPr lang="en-US" sz="1600" b="0" kern="1200" dirty="0">
+                          <a:solidFill>
+                            <a:schemeClr val="tx1"/>
+                          </a:solidFill>
+                          <a:latin typeface="+mn-lt"/>
+                          <a:ea typeface="+mn-ea"/>
+                          <a:cs typeface="+mn-cs"/>
+                        </a:rPr>
+                        <a:t>1.0 w/ 70% train</a:t>
+                      </a:r>
                     </a:p>
                   </a:txBody>
                   <a:tcPr/>
@@ -12440,14 +12813,34 @@
                     <a:bodyPr/>
                     <a:lstStyle/>
                     <a:p>
-                      <a:endParaRPr lang="en-US" sz="1600" b="0" kern="1200" dirty="0">
-                        <a:solidFill>
-                          <a:schemeClr val="tx1"/>
-                        </a:solidFill>
-                        <a:latin typeface="+mn-lt"/>
-                        <a:ea typeface="+mn-ea"/>
-                        <a:cs typeface="+mn-cs"/>
-                      </a:endParaRPr>
+                      <a:pPr marL="0" marR="0" lvl="0" indent="0" algn="l" defTabSz="2264388" rtl="0" eaLnBrk="1" fontAlgn="auto" latinLnBrk="0" hangingPunct="1">
+                        <a:lnSpc>
+                          <a:spcPct val="100000"/>
+                        </a:lnSpc>
+                        <a:spcBef>
+                          <a:spcPts val="0"/>
+                        </a:spcBef>
+                        <a:spcAft>
+                          <a:spcPts val="0"/>
+                        </a:spcAft>
+                        <a:buClrTx/>
+                        <a:buSzTx/>
+                        <a:buFontTx/>
+                        <a:buNone/>
+                        <a:tabLst/>
+                        <a:defRPr/>
+                      </a:pPr>
+                      <a:r>
+                        <a:rPr lang="en-US" sz="1600" b="0" kern="1200" dirty="0">
+                          <a:solidFill>
+                            <a:schemeClr val="tx1"/>
+                          </a:solidFill>
+                          <a:latin typeface="+mn-lt"/>
+                          <a:ea typeface="+mn-ea"/>
+                          <a:cs typeface="+mn-cs"/>
+                        </a:rPr>
+                        <a:t>1.0 w/ 30% test</a:t>
+                      </a:r>
                     </a:p>
                   </a:txBody>
                   <a:tcPr/>
@@ -12457,14 +12850,17 @@
                     <a:bodyPr/>
                     <a:lstStyle/>
                     <a:p>
-                      <a:endParaRPr lang="en-US" sz="1600" b="0" kern="1200" dirty="0">
-                        <a:solidFill>
-                          <a:schemeClr val="tx1"/>
-                        </a:solidFill>
-                        <a:latin typeface="+mn-lt"/>
-                        <a:ea typeface="+mn-ea"/>
-                        <a:cs typeface="+mn-cs"/>
-                      </a:endParaRPr>
+                      <a:r>
+                        <a:rPr lang="en-US" sz="1600" b="0" kern="1200" dirty="0">
+                          <a:solidFill>
+                            <a:schemeClr val="tx1"/>
+                          </a:solidFill>
+                          <a:latin typeface="+mn-lt"/>
+                          <a:ea typeface="+mn-ea"/>
+                          <a:cs typeface="+mn-cs"/>
+                        </a:rPr>
+                        <a:t>1.0 w/ 70% train</a:t>
+                      </a:r>
                     </a:p>
                   </a:txBody>
                   <a:tcPr/>
@@ -12474,14 +12870,34 @@
                     <a:bodyPr/>
                     <a:lstStyle/>
                     <a:p>
-                      <a:endParaRPr lang="en-US" sz="1600" b="0" kern="1200" dirty="0">
-                        <a:solidFill>
-                          <a:schemeClr val="tx1"/>
-                        </a:solidFill>
-                        <a:latin typeface="+mn-lt"/>
-                        <a:ea typeface="+mn-ea"/>
-                        <a:cs typeface="+mn-cs"/>
-                      </a:endParaRPr>
+                      <a:pPr marL="0" marR="0" lvl="0" indent="0" algn="l" defTabSz="2264388" rtl="0" eaLnBrk="1" fontAlgn="auto" latinLnBrk="0" hangingPunct="1">
+                        <a:lnSpc>
+                          <a:spcPct val="100000"/>
+                        </a:lnSpc>
+                        <a:spcBef>
+                          <a:spcPts val="0"/>
+                        </a:spcBef>
+                        <a:spcAft>
+                          <a:spcPts val="0"/>
+                        </a:spcAft>
+                        <a:buClrTx/>
+                        <a:buSzTx/>
+                        <a:buFontTx/>
+                        <a:buNone/>
+                        <a:tabLst/>
+                        <a:defRPr/>
+                      </a:pPr>
+                      <a:r>
+                        <a:rPr lang="en-US" sz="1600" b="0" kern="1200" dirty="0">
+                          <a:solidFill>
+                            <a:schemeClr val="tx1"/>
+                          </a:solidFill>
+                          <a:latin typeface="+mn-lt"/>
+                          <a:ea typeface="+mn-ea"/>
+                          <a:cs typeface="+mn-cs"/>
+                        </a:rPr>
+                        <a:t>1.0 w/o 30% test</a:t>
+                      </a:r>
                     </a:p>
                   </a:txBody>
                   <a:tcPr/>
@@ -12518,14 +12934,17 @@
                     <a:bodyPr/>
                     <a:lstStyle/>
                     <a:p>
-                      <a:endParaRPr lang="en-US" sz="1600" b="0" kern="1200" dirty="0">
-                        <a:solidFill>
-                          <a:schemeClr val="tx1"/>
-                        </a:solidFill>
-                        <a:latin typeface="+mn-lt"/>
-                        <a:ea typeface="+mn-ea"/>
-                        <a:cs typeface="+mn-cs"/>
-                      </a:endParaRPr>
+                      <a:r>
+                        <a:rPr lang="en-US" sz="1600" b="0" kern="1200" dirty="0">
+                          <a:solidFill>
+                            <a:schemeClr val="tx1"/>
+                          </a:solidFill>
+                          <a:latin typeface="+mn-lt"/>
+                          <a:ea typeface="+mn-ea"/>
+                          <a:cs typeface="+mn-cs"/>
+                        </a:rPr>
+                        <a:t>5Fold Mean:  .996420</a:t>
+                      </a:r>
                     </a:p>
                   </a:txBody>
                   <a:tcPr/>
@@ -12535,14 +12954,28 @@
                     <a:bodyPr/>
                     <a:lstStyle/>
                     <a:p>
-                      <a:endParaRPr lang="en-US" sz="1600" b="0" kern="1200" dirty="0">
-                        <a:solidFill>
-                          <a:schemeClr val="tx1"/>
-                        </a:solidFill>
-                        <a:latin typeface="+mn-lt"/>
-                        <a:ea typeface="+mn-ea"/>
-                        <a:cs typeface="+mn-cs"/>
-                      </a:endParaRPr>
+                      <a:r>
+                        <a:rPr lang="en-US" sz="1600" b="0" kern="1200" dirty="0">
+                          <a:solidFill>
+                            <a:schemeClr val="tx1"/>
+                          </a:solidFill>
+                          <a:latin typeface="+mn-lt"/>
+                          <a:ea typeface="+mn-ea"/>
+                          <a:cs typeface="+mn-cs"/>
+                        </a:rPr>
+                        <a:t>5Fold Mean: </a:t>
+                      </a:r>
+                      <a:r>
+                        <a:rPr lang="en-US" sz="1600" b="1" kern="1200" dirty="0">
+                          <a:solidFill>
+                            <a:srgbClr val="FF0000"/>
+                          </a:solidFill>
+                          <a:latin typeface="+mn-lt"/>
+                          <a:ea typeface="+mn-ea"/>
+                          <a:cs typeface="+mn-cs"/>
+                        </a:rPr>
+                        <a:t>0.058976833</a:t>
+                      </a:r>
                     </a:p>
                   </a:txBody>
                   <a:tcPr/>
@@ -12578,7 +13011,7 @@
                           <a:ea typeface="+mn-ea"/>
                           <a:cs typeface="+mn-cs"/>
                         </a:rPr>
-                        <a:t>5Fold (100%) : 1</a:t>
+                        <a:t>2Fold Mean : 1.0</a:t>
                       </a:r>
                     </a:p>
                   </a:txBody>
@@ -12589,14 +13022,28 @@
                     <a:bodyPr/>
                     <a:lstStyle/>
                     <a:p>
-                      <a:endParaRPr lang="en-US" sz="1600" b="0" kern="1200" dirty="0">
-                        <a:solidFill>
-                          <a:schemeClr val="tx1"/>
-                        </a:solidFill>
-                        <a:latin typeface="+mn-lt"/>
-                        <a:ea typeface="+mn-ea"/>
-                        <a:cs typeface="+mn-cs"/>
-                      </a:endParaRPr>
+                      <a:r>
+                        <a:rPr lang="en-US" sz="1600" b="0" kern="1200" dirty="0">
+                          <a:solidFill>
+                            <a:schemeClr val="tx1"/>
+                          </a:solidFill>
+                          <a:latin typeface="+mn-lt"/>
+                          <a:ea typeface="+mn-ea"/>
+                          <a:cs typeface="+mn-cs"/>
+                        </a:rPr>
+                        <a:t>2Fold Mean: </a:t>
+                      </a:r>
+                      <a:r>
+                        <a:rPr lang="en-US" sz="1600" b="1" kern="1200" dirty="0">
+                          <a:solidFill>
+                            <a:srgbClr val="FF0000"/>
+                          </a:solidFill>
+                          <a:latin typeface="+mn-lt"/>
+                          <a:ea typeface="+mn-ea"/>
+                          <a:cs typeface="+mn-cs"/>
+                        </a:rPr>
+                        <a:t>0.071940617</a:t>
+                      </a:r>
                     </a:p>
                   </a:txBody>
                   <a:tcPr/>

</xml_diff>

<commit_message>
[Poster] 1.0 test accuracy bug fixed.
KFold SVM not working, kernel type = linear seems to be unset from get_cv_sore route
Kept the 70/30 split, the 5 fold does an 80/20 random split
</commit_message>
<xml_diff>
--- a/report/poster.pptx
+++ b/report/poster.pptx
@@ -10634,27 +10634,7 @@
                       <a:latin typeface="Calibri" panose="020F0502020204030204" pitchFamily="34" charset="0"/>
                       <a:cs typeface="Calibri" panose="020F0502020204030204" pitchFamily="34" charset="0"/>
                     </a:rPr>
-                    <a:t>The total datasets after vectorizing were: 559 LinkedIn m x n =&lt;559, 2936&gt;     while the </a:t>
-                  </a:r>
-                  <a:r>
-                    <a:rPr lang="en-US" sz="1600" dirty="0" err="1">
-                      <a:solidFill>
-                        <a:schemeClr val="tx1"/>
-                      </a:solidFill>
-                      <a:latin typeface="Calibri" panose="020F0502020204030204" pitchFamily="34" charset="0"/>
-                      <a:cs typeface="Calibri" panose="020F0502020204030204" pitchFamily="34" charset="0"/>
-                    </a:rPr>
-                    <a:t>expium</a:t>
-                  </a:r>
-                  <a:r>
-                    <a:rPr lang="en-US" sz="1600" dirty="0">
-                      <a:solidFill>
-                        <a:schemeClr val="tx1"/>
-                      </a:solidFill>
-                      <a:latin typeface="Calibri" panose="020F0502020204030204" pitchFamily="34" charset="0"/>
-                      <a:cs typeface="Calibri" panose="020F0502020204030204" pitchFamily="34" charset="0"/>
-                    </a:rPr>
-                    <a:t> dataset m x n :  &lt;5435, 1970&gt;</a:t>
+                    <a:t>The shape of the datasets after vectorizing were: LinkedIn m x n = &lt;559, 2936&gt;  and Expium dataset m x n = &lt;5435, 1970&gt;</a:t>
                   </a:r>
                 </a:p>
                 <a:p>
@@ -11174,13 +11154,24 @@
                   <a:schemeClr val="tx1"/>
                 </a:solidFill>
               </a:rPr>
-              <a:t>- While Linkedin NB and SVM 1.0 accuracy seems surprising, one can easily intuit  the cause being n&gt;&gt; m. </a:t>
+              <a:t>- The SVM classifier was only run with splitting up data once instead of the bagging like </a:t>
             </a:r>
-            <a:endParaRPr lang="en-US" sz="1333" dirty="0">
-              <a:solidFill>
-                <a:schemeClr val="tx1"/>
-              </a:solidFill>
-            </a:endParaRPr>
+            <a:r>
+              <a:rPr lang="en-US" sz="1600" dirty="0" err="1">
+                <a:solidFill>
+                  <a:schemeClr val="tx1"/>
+                </a:solidFill>
+              </a:rPr>
+              <a:t>kFold</a:t>
+            </a:r>
+            <a:r>
+              <a:rPr lang="en-US" sz="1600" dirty="0">
+                <a:solidFill>
+                  <a:schemeClr val="tx1"/>
+                </a:solidFill>
+              </a:rPr>
+              <a:t> cross validation completed for the others</a:t>
+            </a:r>
           </a:p>
         </p:txBody>
       </p:sp>
@@ -12294,7 +12285,7 @@
           <p:nvPr>
             <p:extLst>
               <p:ext uri="{D42A27DB-BD31-4B8C-83A1-F6EECF244321}">
-                <p14:modId xmlns:p14="http://schemas.microsoft.com/office/powerpoint/2010/main" val="1805633729"/>
+                <p14:modId xmlns:p14="http://schemas.microsoft.com/office/powerpoint/2010/main" val="2476661558"/>
               </p:ext>
             </p:extLst>
           </p:nvPr>
@@ -12331,14 +12322,14 @@
                     </a:ext>
                   </a:extLst>
                 </a:gridCol>
-                <a:gridCol w="1831962">
+                <a:gridCol w="1984362">
                   <a:extLst>
                     <a:ext uri="{9D8B030D-6E8A-4147-A177-3AD203B41FA5}">
                       <a16:colId xmlns:a16="http://schemas.microsoft.com/office/drawing/2014/main" val="2326900635"/>
                     </a:ext>
                   </a:extLst>
                 </a:gridCol>
-                <a:gridCol w="2509372">
+                <a:gridCol w="2356972">
                   <a:extLst>
                     <a:ext uri="{9D8B030D-6E8A-4147-A177-3AD203B41FA5}">
                       <a16:colId xmlns:a16="http://schemas.microsoft.com/office/drawing/2014/main" val="2621933109"/>
@@ -12641,18 +12632,8 @@
                           <a:ea typeface="+mn-ea"/>
                           <a:cs typeface="+mn-cs"/>
                         </a:rPr>
-                        <a:t>1.0 w/ 70% train</a:t>
+                        <a:t>1.0 w/ 70% train*</a:t>
                       </a:r>
-                    </a:p>
-                    <a:p>
-                      <a:endParaRPr lang="en-US" sz="1600" b="0" kern="1200" dirty="0">
-                        <a:solidFill>
-                          <a:schemeClr val="tx1"/>
-                        </a:solidFill>
-                        <a:latin typeface="+mn-lt"/>
-                        <a:ea typeface="+mn-ea"/>
-                        <a:cs typeface="+mn-cs"/>
-                      </a:endParaRPr>
                     </a:p>
                   </a:txBody>
                   <a:tcPr/>
@@ -12688,37 +12669,7 @@
                           <a:ea typeface="+mn-ea"/>
                           <a:cs typeface="+mn-cs"/>
                         </a:rPr>
-                        <a:t>1.0 w/ 30% test</a:t>
-                      </a:r>
-                    </a:p>
-                    <a:p>
-                      <a:endParaRPr lang="en-US" sz="1600" b="0" kern="1200" dirty="0">
-                        <a:solidFill>
-                          <a:schemeClr val="tx1"/>
-                        </a:solidFill>
-                        <a:latin typeface="+mn-lt"/>
-                        <a:ea typeface="+mn-ea"/>
-                        <a:cs typeface="+mn-cs"/>
-                      </a:endParaRPr>
-                    </a:p>
-                  </a:txBody>
-                  <a:tcPr/>
-                </a:tc>
-                <a:tc>
-                  <a:txBody>
-                    <a:bodyPr/>
-                    <a:lstStyle/>
-                    <a:p>
-                      <a:r>
-                        <a:rPr lang="en-US" sz="1600" b="0" kern="1200" dirty="0">
-                          <a:solidFill>
-                            <a:schemeClr val="tx1"/>
-                          </a:solidFill>
-                          <a:latin typeface="+mn-lt"/>
-                          <a:ea typeface="+mn-ea"/>
-                          <a:cs typeface="+mn-cs"/>
-                        </a:rPr>
-                        <a:t>1.0 w/ 30% train</a:t>
+                        <a:t>0.29166 w/o 30% test</a:t>
                       </a:r>
                     </a:p>
                   </a:txBody>
@@ -12738,7 +12689,27 @@
                           <a:ea typeface="+mn-ea"/>
                           <a:cs typeface="+mn-cs"/>
                         </a:rPr>
-                        <a:t>1.0 w/o 30% test</a:t>
+                        <a:t>1.0 w/ 70% train*</a:t>
+                      </a:r>
+                    </a:p>
+                  </a:txBody>
+                  <a:tcPr/>
+                </a:tc>
+                <a:tc>
+                  <a:txBody>
+                    <a:bodyPr/>
+                    <a:lstStyle/>
+                    <a:p>
+                      <a:r>
+                        <a:rPr lang="en-US" sz="1600" b="0" kern="1200" dirty="0">
+                          <a:solidFill>
+                            <a:schemeClr val="tx1"/>
+                          </a:solidFill>
+                          <a:latin typeface="+mn-lt"/>
+                          <a:ea typeface="+mn-ea"/>
+                          <a:cs typeface="+mn-cs"/>
+                        </a:rPr>
+                        <a:t>0.223175 w/ 30% test</a:t>
                       </a:r>
                     </a:p>
                   </a:txBody>
@@ -12802,7 +12773,7 @@
                           <a:ea typeface="+mn-ea"/>
                           <a:cs typeface="+mn-cs"/>
                         </a:rPr>
-                        <a:t>1.0 w/ 70% train</a:t>
+                        <a:t> 5Fold Mean: 0.65251</a:t>
                       </a:r>
                     </a:p>
                   </a:txBody>
@@ -12839,7 +12810,7 @@
                           <a:ea typeface="+mn-ea"/>
                           <a:cs typeface="+mn-cs"/>
                         </a:rPr>
-                        <a:t>1.0 w/ 30% test</a:t>
+                        <a:t>5Fold Mean: 0.11613</a:t>
                       </a:r>
                     </a:p>
                   </a:txBody>
@@ -12859,7 +12830,7 @@
                           <a:ea typeface="+mn-ea"/>
                           <a:cs typeface="+mn-cs"/>
                         </a:rPr>
-                        <a:t>1.0 w/ 70% train</a:t>
+                        <a:t>5Fold Mean: 0.77097</a:t>
                       </a:r>
                     </a:p>
                   </a:txBody>
@@ -12896,7 +12867,7 @@
                           <a:ea typeface="+mn-ea"/>
                           <a:cs typeface="+mn-cs"/>
                         </a:rPr>
-                        <a:t>1.0 w/o 30% test</a:t>
+                        <a:t>5Fold Mean: 0.208463</a:t>
                       </a:r>
                     </a:p>
                   </a:txBody>

</xml_diff>

<commit_message>
[Poster] Final changes: removed gradient from right
</commit_message>
<xml_diff>
--- a/report/poster.pptx
+++ b/report/poster.pptx
@@ -262,7 +262,7 @@
               <a:pPr>
                 <a:defRPr/>
               </a:pPr>
-              <a:t>12/10/18</a:t>
+              <a:t>12/11/18</a:t>
             </a:fld>
             <a:endParaRPr lang="en-US"/>
           </a:p>
@@ -959,7 +959,7 @@
               <a:pPr>
                 <a:defRPr/>
               </a:pPr>
-              <a:t>12/10/18</a:t>
+              <a:t>12/11/18</a:t>
             </a:fld>
             <a:endParaRPr lang="en-US"/>
           </a:p>
@@ -1172,7 +1172,7 @@
               <a:pPr>
                 <a:defRPr/>
               </a:pPr>
-              <a:t>12/10/18</a:t>
+              <a:t>12/11/18</a:t>
             </a:fld>
             <a:endParaRPr lang="en-US"/>
           </a:p>
@@ -1395,7 +1395,7 @@
               <a:pPr>
                 <a:defRPr/>
               </a:pPr>
-              <a:t>12/10/18</a:t>
+              <a:t>12/11/18</a:t>
             </a:fld>
             <a:endParaRPr lang="en-US"/>
           </a:p>
@@ -1608,7 +1608,7 @@
               <a:pPr>
                 <a:defRPr/>
               </a:pPr>
-              <a:t>12/10/18</a:t>
+              <a:t>12/11/18</a:t>
             </a:fld>
             <a:endParaRPr lang="en-US"/>
           </a:p>
@@ -1898,7 +1898,7 @@
               <a:pPr>
                 <a:defRPr/>
               </a:pPr>
-              <a:t>12/10/18</a:t>
+              <a:t>12/11/18</a:t>
             </a:fld>
             <a:endParaRPr lang="en-US"/>
           </a:p>
@@ -2228,7 +2228,7 @@
               <a:pPr>
                 <a:defRPr/>
               </a:pPr>
-              <a:t>12/10/18</a:t>
+              <a:t>12/11/18</a:t>
             </a:fld>
             <a:endParaRPr lang="en-US"/>
           </a:p>
@@ -2697,7 +2697,7 @@
               <a:pPr>
                 <a:defRPr/>
               </a:pPr>
-              <a:t>12/10/18</a:t>
+              <a:t>12/11/18</a:t>
             </a:fld>
             <a:endParaRPr lang="en-US"/>
           </a:p>
@@ -2859,7 +2859,7 @@
               <a:pPr>
                 <a:defRPr/>
               </a:pPr>
-              <a:t>12/10/18</a:t>
+              <a:t>12/11/18</a:t>
             </a:fld>
             <a:endParaRPr lang="en-US"/>
           </a:p>
@@ -2999,7 +2999,7 @@
               <a:pPr>
                 <a:defRPr/>
               </a:pPr>
-              <a:t>12/10/18</a:t>
+              <a:t>12/11/18</a:t>
             </a:fld>
             <a:endParaRPr lang="en-US"/>
           </a:p>
@@ -3319,7 +3319,7 @@
               <a:pPr>
                 <a:defRPr/>
               </a:pPr>
-              <a:t>12/10/18</a:t>
+              <a:t>12/11/18</a:t>
             </a:fld>
             <a:endParaRPr lang="en-US"/>
           </a:p>
@@ -3619,7 +3619,7 @@
               <a:pPr>
                 <a:defRPr/>
               </a:pPr>
-              <a:t>12/10/18</a:t>
+              <a:t>12/11/18</a:t>
             </a:fld>
             <a:endParaRPr lang="en-US"/>
           </a:p>
@@ -3945,7 +3945,7 @@
               <a:pPr>
                 <a:defRPr/>
               </a:pPr>
-              <a:t>12/10/18</a:t>
+              <a:t>12/11/18</a:t>
             </a:fld>
             <a:endParaRPr lang="en-US"/>
           </a:p>
@@ -7355,20 +7355,9 @@
               <a:prstGeom prst="rect">
                 <a:avLst/>
               </a:prstGeom>
-              <a:gradFill>
-                <a:gsLst>
-                  <a:gs pos="6000">
-                    <a:srgbClr val="394987"/>
-                  </a:gs>
-                  <a:gs pos="0">
-                    <a:srgbClr val="3B4785"/>
-                  </a:gs>
-                  <a:gs pos="62000">
-                    <a:srgbClr val="558BD2"/>
-                  </a:gs>
-                </a:gsLst>
-                <a:lin ang="0" scaled="0"/>
-              </a:gradFill>
+              <a:solidFill>
+                <a:srgbClr val="558BD2"/>
+              </a:solidFill>
               <a:ln>
                 <a:noFill/>
               </a:ln>
@@ -8110,20 +8099,9 @@
               <a:prstGeom prst="rect">
                 <a:avLst/>
               </a:prstGeom>
-              <a:gradFill>
-                <a:gsLst>
-                  <a:gs pos="4000">
-                    <a:srgbClr val="394987"/>
-                  </a:gs>
-                  <a:gs pos="0">
-                    <a:srgbClr val="3A4781"/>
-                  </a:gs>
-                  <a:gs pos="62000">
-                    <a:srgbClr val="558BD2"/>
-                  </a:gs>
-                </a:gsLst>
-                <a:lin ang="0" scaled="0"/>
-              </a:gradFill>
+              <a:solidFill>
+                <a:srgbClr val="558BD2"/>
+              </a:solidFill>
               <a:ln>
                 <a:noFill/>
               </a:ln>
@@ -9229,8 +9207,8 @@
             </a:p>
           </p:txBody>
         </p:sp>
-        <mc:AlternateContent xmlns:mc="http://schemas.openxmlformats.org/markup-compatibility/2006">
-          <mc:Choice xmlns:a14="http://schemas.microsoft.com/office/drawing/2010/main" Requires="a14">
+        <mc:AlternateContent xmlns:mc="http://schemas.openxmlformats.org/markup-compatibility/2006" xmlns:a14="http://schemas.microsoft.com/office/drawing/2010/main">
+          <mc:Choice Requires="a14">
             <p:sp>
               <p:nvSpPr>
                 <p:cNvPr id="55" name="Text Placeholder 19">
@@ -10817,7 +10795,7 @@
               </p:txBody>
             </p:sp>
           </mc:Choice>
-          <mc:Fallback>
+          <mc:Fallback xmlns="">
             <p:sp>
               <p:nvSpPr>
                 <p:cNvPr id="55" name="Text Placeholder 19">
@@ -11420,20 +11398,9 @@
               <a:prstGeom prst="rect">
                 <a:avLst/>
               </a:prstGeom>
-              <a:gradFill>
-                <a:gsLst>
-                  <a:gs pos="4000">
-                    <a:srgbClr val="394987"/>
-                  </a:gs>
-                  <a:gs pos="0">
-                    <a:srgbClr val="3A4781"/>
-                  </a:gs>
-                  <a:gs pos="62000">
-                    <a:srgbClr val="558BD2"/>
-                  </a:gs>
-                </a:gsLst>
-                <a:lin ang="0" scaled="0"/>
-              </a:gradFill>
+              <a:solidFill>
+                <a:srgbClr val="558BD2"/>
+              </a:solidFill>
               <a:ln>
                 <a:noFill/>
               </a:ln>

</xml_diff>

<commit_message>
[Full Results] Updated report and poster with full run results
The SVM classifier took multiple days to report results on a 64GB 6core machine
Features are bag of words with stop words removed
</commit_message>
<xml_diff>
--- a/report/poster.pptx
+++ b/report/poster.pptx
@@ -262,7 +262,7 @@
               <a:pPr>
                 <a:defRPr/>
               </a:pPr>
-              <a:t>12/11/18</a:t>
+              <a:t>1/8/19</a:t>
             </a:fld>
             <a:endParaRPr lang="en-US"/>
           </a:p>
@@ -959,7 +959,7 @@
               <a:pPr>
                 <a:defRPr/>
               </a:pPr>
-              <a:t>12/11/18</a:t>
+              <a:t>1/8/19</a:t>
             </a:fld>
             <a:endParaRPr lang="en-US"/>
           </a:p>
@@ -1172,7 +1172,7 @@
               <a:pPr>
                 <a:defRPr/>
               </a:pPr>
-              <a:t>12/11/18</a:t>
+              <a:t>1/8/19</a:t>
             </a:fld>
             <a:endParaRPr lang="en-US"/>
           </a:p>
@@ -1395,7 +1395,7 @@
               <a:pPr>
                 <a:defRPr/>
               </a:pPr>
-              <a:t>12/11/18</a:t>
+              <a:t>1/8/19</a:t>
             </a:fld>
             <a:endParaRPr lang="en-US"/>
           </a:p>
@@ -1608,7 +1608,7 @@
               <a:pPr>
                 <a:defRPr/>
               </a:pPr>
-              <a:t>12/11/18</a:t>
+              <a:t>1/8/19</a:t>
             </a:fld>
             <a:endParaRPr lang="en-US"/>
           </a:p>
@@ -1898,7 +1898,7 @@
               <a:pPr>
                 <a:defRPr/>
               </a:pPr>
-              <a:t>12/11/18</a:t>
+              <a:t>1/8/19</a:t>
             </a:fld>
             <a:endParaRPr lang="en-US"/>
           </a:p>
@@ -2228,7 +2228,7 @@
               <a:pPr>
                 <a:defRPr/>
               </a:pPr>
-              <a:t>12/11/18</a:t>
+              <a:t>1/8/19</a:t>
             </a:fld>
             <a:endParaRPr lang="en-US"/>
           </a:p>
@@ -2697,7 +2697,7 @@
               <a:pPr>
                 <a:defRPr/>
               </a:pPr>
-              <a:t>12/11/18</a:t>
+              <a:t>1/8/19</a:t>
             </a:fld>
             <a:endParaRPr lang="en-US"/>
           </a:p>
@@ -2859,7 +2859,7 @@
               <a:pPr>
                 <a:defRPr/>
               </a:pPr>
-              <a:t>12/11/18</a:t>
+              <a:t>1/8/19</a:t>
             </a:fld>
             <a:endParaRPr lang="en-US"/>
           </a:p>
@@ -2999,7 +2999,7 @@
               <a:pPr>
                 <a:defRPr/>
               </a:pPr>
-              <a:t>12/11/18</a:t>
+              <a:t>1/8/19</a:t>
             </a:fld>
             <a:endParaRPr lang="en-US"/>
           </a:p>
@@ -3319,7 +3319,7 @@
               <a:pPr>
                 <a:defRPr/>
               </a:pPr>
-              <a:t>12/11/18</a:t>
+              <a:t>1/8/19</a:t>
             </a:fld>
             <a:endParaRPr lang="en-US"/>
           </a:p>
@@ -3619,7 +3619,7 @@
               <a:pPr>
                 <a:defRPr/>
               </a:pPr>
-              <a:t>12/11/18</a:t>
+              <a:t>1/8/19</a:t>
             </a:fld>
             <a:endParaRPr lang="en-US"/>
           </a:p>
@@ -3945,7 +3945,7 @@
               <a:pPr>
                 <a:defRPr/>
               </a:pPr>
-              <a:t>12/11/18</a:t>
+              <a:t>1/8/19</a:t>
             </a:fld>
             <a:endParaRPr lang="en-US"/>
           </a:p>
@@ -11075,7 +11075,7 @@
                   <a:schemeClr val="tx1"/>
                 </a:solidFill>
               </a:rPr>
-              <a:t>- The highly non-linear nature of DNN has allowed almost perfect 5Fold mean accuracy on over 3,000 LinkedIn tickets and 5,500 generated tickets, that same benefit has heavily overfit the data as observed by the dismal &lt;7% test prediction accuracy. </a:t>
+              <a:t>- The highly non-linear nature of DNN has allowed almost perfect 5Fold mean train accuracy on LinkedIn and Expium tickets, that same benefit has heavily overfit the data as observed by the 20% 5-Fold mean test prediction accuracy. </a:t>
             </a:r>
           </a:p>
           <a:p>
@@ -11094,7 +11094,7 @@
                   <a:schemeClr val="tx1"/>
                 </a:solidFill>
               </a:rPr>
-              <a:t>- Computational challenges with vectorizing text has prevented us from significantly scaling the number of trained samples, working on a batching solution to count words efficiently, store to a datastore and fetch on batched training and prediction stages. </a:t>
+              <a:t>- The SVM classifier was tested by splitting the data into a 70/30 train test group instead of the k-Fold cross validation method due to the time it takes to run one full iteration of SVM.</a:t>
             </a:r>
           </a:p>
           <a:p>
@@ -11113,42 +11113,7 @@
                   <a:schemeClr val="tx1"/>
                 </a:solidFill>
               </a:rPr>
-              <a:t>- A developer that has never been assigned a ticket will not be considered during prediction, this is normal in triaging. </a:t>
-            </a:r>
-          </a:p>
-          <a:p>
-            <a:pPr>
-              <a:lnSpc>
-                <a:spcPct val="100000"/>
-              </a:lnSpc>
-              <a:spcBef>
-                <a:spcPts val="250"/>
-              </a:spcBef>
-              <a:defRPr/>
-            </a:pPr>
-            <a:r>
-              <a:rPr lang="en-US" sz="1600" dirty="0">
-                <a:solidFill>
-                  <a:schemeClr val="tx1"/>
-                </a:solidFill>
-              </a:rPr>
-              <a:t>- The SVM classifier was only run with splitting up data once instead of the bagging like </a:t>
-            </a:r>
-            <a:r>
-              <a:rPr lang="en-US" sz="1600" dirty="0" err="1">
-                <a:solidFill>
-                  <a:schemeClr val="tx1"/>
-                </a:solidFill>
-              </a:rPr>
-              <a:t>kFold</a:t>
-            </a:r>
-            <a:r>
-              <a:rPr lang="en-US" sz="1600" dirty="0">
-                <a:solidFill>
-                  <a:schemeClr val="tx1"/>
-                </a:solidFill>
-              </a:rPr>
-              <a:t> cross validation completed for the others</a:t>
+              <a:t>- A developer that has never been assigned a ticket will not be considered during prediction, this is common behavior in triaging. </a:t>
             </a:r>
           </a:p>
         </p:txBody>
@@ -11835,8 +11800,24 @@
                       <a:schemeClr val="tx1"/>
                     </a:solidFill>
                   </a:rPr>
-                  <a:t>The initial results of our experiments resulted in poor accuracy on the test set. The DNN overfit the small dataset and we hope that after running on full set (~9x more tickets) the test accuracy will dramatically increase, currently experiments have only been applied to a set of 5,000 tickets</a:t>
+                  <a:t>The initial results of our experiments resulted in low accuracy on the test set.  We expect that with larger datasets and more feature engineering we will be able to surpass the SVM accuracy of ~41%</a:t>
                 </a:r>
+              </a:p>
+              <a:p>
+                <a:pPr>
+                  <a:lnSpc>
+                    <a:spcPct val="100000"/>
+                  </a:lnSpc>
+                  <a:spcBef>
+                    <a:spcPts val="0"/>
+                  </a:spcBef>
+                  <a:defRPr/>
+                </a:pPr>
+                <a:endParaRPr lang="en-US" sz="1600" dirty="0">
+                  <a:solidFill>
+                    <a:schemeClr val="tx1"/>
+                  </a:solidFill>
+                </a:endParaRPr>
               </a:p>
               <a:p>
                 <a:pPr>
@@ -12252,7 +12233,7 @@
           <p:nvPr>
             <p:extLst>
               <p:ext uri="{D42A27DB-BD31-4B8C-83A1-F6EECF244321}">
-                <p14:modId xmlns:p14="http://schemas.microsoft.com/office/powerpoint/2010/main" val="2476661558"/>
+                <p14:modId xmlns:p14="http://schemas.microsoft.com/office/powerpoint/2010/main" val="3352543750"/>
               </p:ext>
             </p:extLst>
           </p:nvPr>
@@ -12347,7 +12328,7 @@
                           <a:ea typeface="+mn-ea"/>
                           <a:cs typeface="+mn-cs"/>
                         </a:rPr>
-                        <a:t>Linkedin Dataset (559/43483)</a:t>
+                        <a:t>Linkedin Dataset (43483)</a:t>
                       </a:r>
                     </a:p>
                   </a:txBody>
@@ -12599,7 +12580,7 @@
                           <a:ea typeface="+mn-ea"/>
                           <a:cs typeface="+mn-cs"/>
                         </a:rPr>
-                        <a:t>1.0 w/ 70% train*</a:t>
+                        <a:t>0.99573 w/ 70% train*</a:t>
                       </a:r>
                     </a:p>
                   </a:txBody>
@@ -12636,7 +12617,7 @@
                           <a:ea typeface="+mn-ea"/>
                           <a:cs typeface="+mn-cs"/>
                         </a:rPr>
-                        <a:t>0.29166 w/o 30% test</a:t>
+                        <a:t>0.408279  w/o 30% test</a:t>
                       </a:r>
                     </a:p>
                   </a:txBody>
@@ -12740,7 +12721,7 @@
                           <a:ea typeface="+mn-ea"/>
                           <a:cs typeface="+mn-cs"/>
                         </a:rPr>
-                        <a:t> 5Fold Mean: 0.65251</a:t>
+                        <a:t> 5Fold Mean: 0.3968</a:t>
                       </a:r>
                     </a:p>
                   </a:txBody>
@@ -12777,7 +12758,7 @@
                           <a:ea typeface="+mn-ea"/>
                           <a:cs typeface="+mn-cs"/>
                         </a:rPr>
-                        <a:t>5Fold Mean: 0.11613</a:t>
+                        <a:t>5Fold Mean: 0.2255</a:t>
                       </a:r>
                     </a:p>
                   </a:txBody>
@@ -12872,6 +12853,23 @@
                     <a:bodyPr/>
                     <a:lstStyle/>
                     <a:p>
+                      <a:pPr marL="0" marR="0" indent="0" algn="l" defTabSz="2264388" rtl="0" eaLnBrk="1" fontAlgn="auto" latinLnBrk="0" hangingPunct="1">
+                        <a:lnSpc>
+                          <a:spcPct val="100000"/>
+                        </a:lnSpc>
+                        <a:spcBef>
+                          <a:spcPts val="0"/>
+                        </a:spcBef>
+                        <a:spcAft>
+                          <a:spcPts val="0"/>
+                        </a:spcAft>
+                        <a:buClrTx/>
+                        <a:buSzTx/>
+                        <a:buFontTx/>
+                        <a:buNone/>
+                        <a:tabLst/>
+                        <a:defRPr/>
+                      </a:pPr>
                       <a:r>
                         <a:rPr lang="en-US" sz="1600" b="0" kern="1200" dirty="0">
                           <a:solidFill>
@@ -12881,7 +12879,7 @@
                           <a:ea typeface="+mn-ea"/>
                           <a:cs typeface="+mn-cs"/>
                         </a:rPr>
-                        <a:t>5Fold Mean:  .996420</a:t>
+                        <a:t>5Fold Mean:  0.9997</a:t>
                       </a:r>
                     </a:p>
                   </a:txBody>
@@ -12892,6 +12890,23 @@
                     <a:bodyPr/>
                     <a:lstStyle/>
                     <a:p>
+                      <a:pPr marL="0" marR="0" indent="0" algn="l" defTabSz="2264388" rtl="0" eaLnBrk="1" fontAlgn="auto" latinLnBrk="0" hangingPunct="1">
+                        <a:lnSpc>
+                          <a:spcPct val="100000"/>
+                        </a:lnSpc>
+                        <a:spcBef>
+                          <a:spcPts val="0"/>
+                        </a:spcBef>
+                        <a:spcAft>
+                          <a:spcPts val="0"/>
+                        </a:spcAft>
+                        <a:buClrTx/>
+                        <a:buSzTx/>
+                        <a:buFontTx/>
+                        <a:buNone/>
+                        <a:tabLst/>
+                        <a:defRPr/>
+                      </a:pPr>
                       <a:r>
                         <a:rPr lang="en-US" sz="1600" b="0" kern="1200" dirty="0">
                           <a:solidFill>
@@ -12912,7 +12927,7 @@
                           <a:ea typeface="+mn-ea"/>
                           <a:cs typeface="+mn-cs"/>
                         </a:rPr>
-                        <a:t>0.058976833</a:t>
+                        <a:t>0.2020</a:t>
                       </a:r>
                     </a:p>
                   </a:txBody>
@@ -12969,7 +12984,7 @@
                           <a:ea typeface="+mn-ea"/>
                           <a:cs typeface="+mn-cs"/>
                         </a:rPr>
-                        <a:t>2Fold Mean: </a:t>
+                        <a:t>5Fold Mean: </a:t>
                       </a:r>
                       <a:r>
                         <a:rPr lang="en-US" sz="1600" b="1" kern="1200" dirty="0">

</xml_diff>